<commit_message>
Update observer pattern lecture
</commit_message>
<xml_diff>
--- a/lectures/02.observer/observer.pptx
+++ b/lectures/02.observer/observer.pptx
@@ -5,55 +5,57 @@
     <p:sldMasterId id="2147483672" r:id="rId1"/>
   </p:sldMasterIdLst>
   <p:notesMasterIdLst>
-    <p:notesMasterId r:id="rId43"/>
+    <p:notesMasterId r:id="rId45"/>
   </p:notesMasterIdLst>
   <p:sldIdLst>
     <p:sldId id="256" r:id="rId2"/>
     <p:sldId id="294" r:id="rId3"/>
     <p:sldId id="296" r:id="rId4"/>
-    <p:sldId id="295" r:id="rId5"/>
-    <p:sldId id="257" r:id="rId6"/>
-    <p:sldId id="258" r:id="rId7"/>
-    <p:sldId id="261" r:id="rId8"/>
-    <p:sldId id="259" r:id="rId9"/>
-    <p:sldId id="260" r:id="rId10"/>
-    <p:sldId id="262" r:id="rId11"/>
-    <p:sldId id="263" r:id="rId12"/>
-    <p:sldId id="264" r:id="rId13"/>
-    <p:sldId id="265" r:id="rId14"/>
-    <p:sldId id="266" r:id="rId15"/>
-    <p:sldId id="267" r:id="rId16"/>
-    <p:sldId id="269" r:id="rId17"/>
-    <p:sldId id="268" r:id="rId18"/>
-    <p:sldId id="270" r:id="rId19"/>
-    <p:sldId id="286" r:id="rId20"/>
-    <p:sldId id="271" r:id="rId21"/>
-    <p:sldId id="272" r:id="rId22"/>
-    <p:sldId id="273" r:id="rId23"/>
-    <p:sldId id="274" r:id="rId24"/>
-    <p:sldId id="275" r:id="rId25"/>
-    <p:sldId id="276" r:id="rId26"/>
-    <p:sldId id="277" r:id="rId27"/>
-    <p:sldId id="279" r:id="rId28"/>
-    <p:sldId id="278" r:id="rId29"/>
-    <p:sldId id="292" r:id="rId30"/>
-    <p:sldId id="280" r:id="rId31"/>
-    <p:sldId id="293" r:id="rId32"/>
-    <p:sldId id="281" r:id="rId33"/>
-    <p:sldId id="282" r:id="rId34"/>
-    <p:sldId id="283" r:id="rId35"/>
-    <p:sldId id="284" r:id="rId36"/>
-    <p:sldId id="285" r:id="rId37"/>
-    <p:sldId id="287" r:id="rId38"/>
-    <p:sldId id="288" r:id="rId39"/>
-    <p:sldId id="289" r:id="rId40"/>
-    <p:sldId id="290" r:id="rId41"/>
-    <p:sldId id="291" r:id="rId42"/>
+    <p:sldId id="297" r:id="rId5"/>
+    <p:sldId id="295" r:id="rId6"/>
+    <p:sldId id="257" r:id="rId7"/>
+    <p:sldId id="258" r:id="rId8"/>
+    <p:sldId id="261" r:id="rId9"/>
+    <p:sldId id="259" r:id="rId10"/>
+    <p:sldId id="260" r:id="rId11"/>
+    <p:sldId id="262" r:id="rId12"/>
+    <p:sldId id="263" r:id="rId13"/>
+    <p:sldId id="264" r:id="rId14"/>
+    <p:sldId id="265" r:id="rId15"/>
+    <p:sldId id="266" r:id="rId16"/>
+    <p:sldId id="267" r:id="rId17"/>
+    <p:sldId id="269" r:id="rId18"/>
+    <p:sldId id="268" r:id="rId19"/>
+    <p:sldId id="270" r:id="rId20"/>
+    <p:sldId id="286" r:id="rId21"/>
+    <p:sldId id="271" r:id="rId22"/>
+    <p:sldId id="272" r:id="rId23"/>
+    <p:sldId id="273" r:id="rId24"/>
+    <p:sldId id="274" r:id="rId25"/>
+    <p:sldId id="275" r:id="rId26"/>
+    <p:sldId id="276" r:id="rId27"/>
+    <p:sldId id="277" r:id="rId28"/>
+    <p:sldId id="298" r:id="rId29"/>
+    <p:sldId id="279" r:id="rId30"/>
+    <p:sldId id="278" r:id="rId31"/>
+    <p:sldId id="292" r:id="rId32"/>
+    <p:sldId id="280" r:id="rId33"/>
+    <p:sldId id="293" r:id="rId34"/>
+    <p:sldId id="281" r:id="rId35"/>
+    <p:sldId id="282" r:id="rId36"/>
+    <p:sldId id="283" r:id="rId37"/>
+    <p:sldId id="284" r:id="rId38"/>
+    <p:sldId id="285" r:id="rId39"/>
+    <p:sldId id="287" r:id="rId40"/>
+    <p:sldId id="288" r:id="rId41"/>
+    <p:sldId id="289" r:id="rId42"/>
+    <p:sldId id="290" r:id="rId43"/>
+    <p:sldId id="291" r:id="rId44"/>
   </p:sldIdLst>
   <p:sldSz cx="9144000" cy="6858000" type="screen4x3"/>
   <p:notesSz cx="6858000" cy="9144000"/>
   <p:custDataLst>
-    <p:tags r:id="rId44"/>
+    <p:tags r:id="rId46"/>
   </p:custDataLst>
   <p:defaultTextStyle>
     <a:defPPr>
@@ -667,7 +669,7 @@
           <a:p>
             <a:fld id="{C72A1285-F988-4153-B7C5-B887A867730D}" type="slidenum">
               <a:rPr lang="ru-RU" smtClean="0"/>
-              <a:t>4</a:t>
+              <a:t>5</a:t>
             </a:fld>
             <a:endParaRPr lang="ru-RU"/>
           </a:p>
@@ -844,7 +846,7 @@
           <a:p>
             <a:fld id="{C72A1285-F988-4153-B7C5-B887A867730D}" type="slidenum">
               <a:rPr lang="ru-RU" smtClean="0"/>
-              <a:t>5</a:t>
+              <a:t>6</a:t>
             </a:fld>
             <a:endParaRPr lang="ru-RU"/>
           </a:p>
@@ -928,7 +930,7 @@
           <a:p>
             <a:fld id="{C72A1285-F988-4153-B7C5-B887A867730D}" type="slidenum">
               <a:rPr lang="ru-RU" smtClean="0"/>
-              <a:t>6</a:t>
+              <a:t>7</a:t>
             </a:fld>
             <a:endParaRPr lang="ru-RU"/>
           </a:p>
@@ -1060,7 +1062,7 @@
           <a:p>
             <a:fld id="{C72A1285-F988-4153-B7C5-B887A867730D}" type="slidenum">
               <a:rPr lang="ru-RU" smtClean="0"/>
-              <a:t>8</a:t>
+              <a:t>9</a:t>
             </a:fld>
             <a:endParaRPr lang="ru-RU"/>
           </a:p>
@@ -1172,7 +1174,7 @@
           <a:p>
             <a:fld id="{C72A1285-F988-4153-B7C5-B887A867730D}" type="slidenum">
               <a:rPr lang="ru-RU" smtClean="0"/>
-              <a:t>10</a:t>
+              <a:t>11</a:t>
             </a:fld>
             <a:endParaRPr lang="ru-RU"/>
           </a:p>
@@ -1275,7 +1277,7 @@
           <a:p>
             <a:fld id="{C72A1285-F988-4153-B7C5-B887A867730D}" type="slidenum">
               <a:rPr lang="ru-RU" smtClean="0"/>
-              <a:t>19</a:t>
+              <a:t>20</a:t>
             </a:fld>
             <a:endParaRPr lang="ru-RU"/>
           </a:p>
@@ -1359,7 +1361,7 @@
           <a:p>
             <a:fld id="{C72A1285-F988-4153-B7C5-B887A867730D}" type="slidenum">
               <a:rPr lang="ru-RU" smtClean="0"/>
-              <a:t>40</a:t>
+              <a:t>42</a:t>
             </a:fld>
             <a:endParaRPr lang="ru-RU"/>
           </a:p>
@@ -5119,763 +5121,51 @@
           <a:p>
             <a:r>
               <a:rPr lang="ru-RU" dirty="0"/>
-              <a:t>Наивная реализация</a:t>
+              <a:t>Требования к приложению</a:t>
             </a:r>
           </a:p>
         </p:txBody>
       </p:sp>
       <p:sp>
         <p:nvSpPr>
-          <p:cNvPr id="4" name="Прямоугольник 3"/>
-          <p:cNvSpPr/>
-          <p:nvPr/>
+          <p:cNvPr id="3" name="Объект 2"/>
+          <p:cNvSpPr>
+            <a:spLocks noGrp="1"/>
+          </p:cNvSpPr>
+          <p:nvPr>
+            <p:ph idx="1"/>
+          </p:nvPr>
         </p:nvSpPr>
-        <p:spPr>
-          <a:xfrm>
-            <a:off x="198190" y="1916832"/>
-            <a:ext cx="8712968" cy="4226798"/>
-          </a:xfrm>
-          <a:prstGeom prst="rect">
-            <a:avLst/>
-          </a:prstGeom>
-        </p:spPr>
+        <p:spPr/>
         <p:txBody>
-          <a:bodyPr wrap="square">
-            <a:spAutoFit/>
-          </a:bodyPr>
+          <a:bodyPr/>
           <a:lstStyle/>
           <a:p>
-            <a:pPr defTabSz="447675">
-              <a:spcAft>
-                <a:spcPts val="0"/>
-              </a:spcAft>
-            </a:pPr>
-            <a:r>
-              <a:rPr lang="ru-RU" sz="1400" dirty="0" err="1">
-                <a:solidFill>
-                  <a:srgbClr val="0000FF"/>
-                </a:solidFill>
-                <a:latin typeface="Consolas"/>
-                <a:ea typeface="Calibri"/>
-                <a:cs typeface="Times New Roman"/>
-              </a:rPr>
-              <a:t>class</a:t>
-            </a:r>
-            <a:r>
-              <a:rPr lang="ru-RU" sz="1400" dirty="0">
-                <a:solidFill>
-                  <a:srgbClr val="000000"/>
-                </a:solidFill>
-                <a:latin typeface="Consolas"/>
-                <a:ea typeface="Calibri"/>
-                <a:cs typeface="Times New Roman"/>
-              </a:rPr>
-              <a:t> </a:t>
-            </a:r>
-            <a:r>
-              <a:rPr lang="ru-RU" sz="1400" dirty="0" err="1">
-                <a:solidFill>
-                  <a:srgbClr val="2B91AF"/>
-                </a:solidFill>
-                <a:latin typeface="Consolas"/>
-                <a:ea typeface="Calibri"/>
-                <a:cs typeface="Times New Roman"/>
-              </a:rPr>
-              <a:t>CWeatherData</a:t>
-            </a:r>
-            <a:endParaRPr lang="ru-RU" sz="1400" dirty="0">
-              <a:ea typeface="Calibri"/>
-              <a:cs typeface="Times New Roman"/>
-            </a:endParaRPr>
-          </a:p>
-          <a:p>
-            <a:pPr defTabSz="447675">
-              <a:spcAft>
-                <a:spcPts val="0"/>
-              </a:spcAft>
-            </a:pPr>
-            <a:r>
-              <a:rPr lang="ru-RU" sz="1400" dirty="0">
-                <a:solidFill>
-                  <a:srgbClr val="000000"/>
-                </a:solidFill>
-                <a:latin typeface="Consolas"/>
-                <a:ea typeface="Calibri"/>
-                <a:cs typeface="Times New Roman"/>
-              </a:rPr>
-              <a:t>{</a:t>
-            </a:r>
-            <a:endParaRPr lang="ru-RU" sz="1400" dirty="0">
-              <a:ea typeface="Calibri"/>
-              <a:cs typeface="Times New Roman"/>
-            </a:endParaRPr>
-          </a:p>
-          <a:p>
-            <a:pPr defTabSz="447675">
-              <a:spcAft>
-                <a:spcPts val="0"/>
-              </a:spcAft>
-            </a:pPr>
-            <a:r>
-              <a:rPr lang="ru-RU" sz="1400" dirty="0" err="1">
-                <a:solidFill>
-                  <a:srgbClr val="0000FF"/>
-                </a:solidFill>
-                <a:latin typeface="Consolas"/>
-                <a:ea typeface="Calibri"/>
-                <a:cs typeface="Times New Roman"/>
-              </a:rPr>
-              <a:t>public</a:t>
-            </a:r>
-            <a:r>
-              <a:rPr lang="ru-RU" sz="1400" dirty="0">
-                <a:solidFill>
-                  <a:srgbClr val="000000"/>
-                </a:solidFill>
-                <a:latin typeface="Consolas"/>
-                <a:ea typeface="Calibri"/>
-                <a:cs typeface="Times New Roman"/>
-              </a:rPr>
-              <a:t>:</a:t>
-            </a:r>
-            <a:endParaRPr lang="ru-RU" sz="1400" dirty="0">
-              <a:ea typeface="Calibri"/>
-              <a:cs typeface="Times New Roman"/>
-            </a:endParaRPr>
-          </a:p>
-          <a:p>
-            <a:pPr defTabSz="447675">
-              <a:spcAft>
-                <a:spcPts val="0"/>
-              </a:spcAft>
-            </a:pPr>
-            <a:r>
-              <a:rPr lang="en-US" sz="1400" dirty="0">
-                <a:solidFill>
-                  <a:srgbClr val="000000"/>
-                </a:solidFill>
-                <a:latin typeface="Consolas"/>
-                <a:ea typeface="Calibri"/>
-                <a:cs typeface="Times New Roman"/>
-              </a:rPr>
-              <a:t>	</a:t>
-            </a:r>
-            <a:r>
-              <a:rPr lang="en-US" sz="1400" dirty="0">
-                <a:solidFill>
-                  <a:srgbClr val="0000FF"/>
-                </a:solidFill>
-                <a:latin typeface="Consolas"/>
-                <a:ea typeface="Calibri"/>
-                <a:cs typeface="Times New Roman"/>
-              </a:rPr>
-              <a:t>void</a:t>
-            </a:r>
-            <a:r>
-              <a:rPr lang="en-US" sz="1400" dirty="0">
-                <a:solidFill>
-                  <a:srgbClr val="000000"/>
-                </a:solidFill>
-                <a:latin typeface="Consolas"/>
-                <a:ea typeface="Calibri"/>
-                <a:cs typeface="Times New Roman"/>
-              </a:rPr>
-              <a:t> </a:t>
-            </a:r>
-            <a:r>
-              <a:rPr lang="en-US" sz="1400" dirty="0" err="1">
-                <a:solidFill>
-                  <a:srgbClr val="000000"/>
-                </a:solidFill>
-                <a:latin typeface="Consolas"/>
-                <a:ea typeface="Calibri"/>
-                <a:cs typeface="Times New Roman"/>
-              </a:rPr>
-              <a:t>MeasurementsChanged</a:t>
-            </a:r>
-            <a:r>
-              <a:rPr lang="en-US" sz="1400" dirty="0">
-                <a:solidFill>
-                  <a:srgbClr val="000000"/>
-                </a:solidFill>
-                <a:latin typeface="Consolas"/>
-                <a:ea typeface="Calibri"/>
-                <a:cs typeface="Times New Roman"/>
-              </a:rPr>
-              <a:t>()</a:t>
-            </a:r>
-            <a:endParaRPr lang="ru-RU" sz="1400" dirty="0">
-              <a:ea typeface="Calibri"/>
-              <a:cs typeface="Times New Roman"/>
-            </a:endParaRPr>
-          </a:p>
-          <a:p>
-            <a:pPr defTabSz="447675">
-              <a:spcAft>
-                <a:spcPts val="0"/>
-              </a:spcAft>
-            </a:pPr>
-            <a:r>
-              <a:rPr lang="en-US" sz="1400" dirty="0">
-                <a:solidFill>
-                  <a:srgbClr val="000000"/>
-                </a:solidFill>
-                <a:latin typeface="Consolas"/>
-                <a:ea typeface="Calibri"/>
-                <a:cs typeface="Times New Roman"/>
-              </a:rPr>
-              <a:t>	{</a:t>
-            </a:r>
-          </a:p>
-          <a:p>
-            <a:pPr defTabSz="447675">
-              <a:spcAft>
-                <a:spcPts val="0"/>
-              </a:spcAft>
-            </a:pPr>
-            <a:r>
-              <a:rPr lang="en-US" sz="1400" dirty="0">
-                <a:ea typeface="Calibri"/>
-                <a:cs typeface="Times New Roman"/>
-              </a:rPr>
-              <a:t>		</a:t>
-            </a:r>
-            <a:r>
-              <a:rPr lang="ru-RU" sz="1400" dirty="0">
-                <a:solidFill>
-                  <a:srgbClr val="008000"/>
-                </a:solidFill>
-                <a:latin typeface="Consolas"/>
-                <a:ea typeface="Calibri"/>
-                <a:cs typeface="Times New Roman"/>
-              </a:rPr>
-              <a:t> // Для получения данных вызываем уже реализованные </a:t>
-            </a:r>
-            <a:r>
-              <a:rPr lang="en-US" sz="1400" dirty="0">
-                <a:solidFill>
-                  <a:srgbClr val="008000"/>
-                </a:solidFill>
-                <a:latin typeface="Consolas"/>
-                <a:ea typeface="Calibri"/>
-                <a:cs typeface="Times New Roman"/>
-              </a:rPr>
-              <a:t>getter-</a:t>
-            </a:r>
-            <a:r>
-              <a:rPr lang="ru-RU" sz="1400" dirty="0">
-                <a:solidFill>
-                  <a:srgbClr val="008000"/>
-                </a:solidFill>
-                <a:latin typeface="Consolas"/>
-                <a:ea typeface="Calibri"/>
-                <a:cs typeface="Times New Roman"/>
-              </a:rPr>
-              <a:t>ы</a:t>
-            </a:r>
-            <a:endParaRPr lang="ru-RU" sz="1400" dirty="0">
-              <a:ea typeface="Calibri"/>
-              <a:cs typeface="Times New Roman"/>
-            </a:endParaRPr>
-          </a:p>
-          <a:p>
-            <a:pPr defTabSz="447675">
-              <a:spcAft>
-                <a:spcPts val="0"/>
-              </a:spcAft>
-            </a:pPr>
-            <a:r>
-              <a:rPr lang="en-US" sz="1400" dirty="0">
-                <a:solidFill>
-                  <a:srgbClr val="000000"/>
-                </a:solidFill>
-                <a:latin typeface="Consolas"/>
-                <a:ea typeface="Calibri"/>
-                <a:cs typeface="Times New Roman"/>
-              </a:rPr>
-              <a:t>		</a:t>
-            </a:r>
-            <a:r>
-              <a:rPr lang="en-US" sz="1400" dirty="0">
-                <a:solidFill>
-                  <a:srgbClr val="0000FF"/>
-                </a:solidFill>
-                <a:latin typeface="Consolas"/>
-                <a:ea typeface="Calibri"/>
-                <a:cs typeface="Times New Roman"/>
-              </a:rPr>
-              <a:t>double</a:t>
-            </a:r>
-            <a:r>
-              <a:rPr lang="en-US" sz="1400" dirty="0">
-                <a:solidFill>
-                  <a:srgbClr val="000000"/>
-                </a:solidFill>
-                <a:latin typeface="Consolas"/>
-                <a:ea typeface="Calibri"/>
-                <a:cs typeface="Times New Roman"/>
-              </a:rPr>
-              <a:t> temp = </a:t>
-            </a:r>
-            <a:r>
-              <a:rPr lang="en-US" sz="1400" dirty="0" err="1">
-                <a:solidFill>
-                  <a:srgbClr val="000000"/>
-                </a:solidFill>
-                <a:latin typeface="Consolas"/>
-                <a:ea typeface="Calibri"/>
-                <a:cs typeface="Times New Roman"/>
-              </a:rPr>
-              <a:t>GetTemperature</a:t>
-            </a:r>
-            <a:r>
-              <a:rPr lang="en-US" sz="1400" dirty="0">
-                <a:solidFill>
-                  <a:srgbClr val="000000"/>
-                </a:solidFill>
-                <a:latin typeface="Consolas"/>
-                <a:ea typeface="Calibri"/>
-                <a:cs typeface="Times New Roman"/>
-              </a:rPr>
-              <a:t>();</a:t>
-            </a:r>
-            <a:endParaRPr lang="ru-RU" sz="1400" dirty="0">
-              <a:ea typeface="Calibri"/>
-              <a:cs typeface="Times New Roman"/>
-            </a:endParaRPr>
-          </a:p>
-          <a:p>
-            <a:pPr defTabSz="447675">
-              <a:spcAft>
-                <a:spcPts val="0"/>
-              </a:spcAft>
-            </a:pPr>
-            <a:r>
-              <a:rPr lang="en-US" sz="1400" dirty="0">
-                <a:solidFill>
-                  <a:srgbClr val="000000"/>
-                </a:solidFill>
-                <a:latin typeface="Consolas"/>
-                <a:ea typeface="Calibri"/>
-                <a:cs typeface="Times New Roman"/>
-              </a:rPr>
-              <a:t>		</a:t>
-            </a:r>
-            <a:r>
-              <a:rPr lang="en-US" sz="1400" dirty="0">
-                <a:solidFill>
-                  <a:srgbClr val="0000FF"/>
-                </a:solidFill>
-                <a:latin typeface="Consolas"/>
-                <a:ea typeface="Calibri"/>
-                <a:cs typeface="Times New Roman"/>
-              </a:rPr>
-              <a:t>double</a:t>
-            </a:r>
-            <a:r>
-              <a:rPr lang="en-US" sz="1400" dirty="0">
-                <a:solidFill>
-                  <a:srgbClr val="000000"/>
-                </a:solidFill>
-                <a:latin typeface="Consolas"/>
-                <a:ea typeface="Calibri"/>
-                <a:cs typeface="Times New Roman"/>
-              </a:rPr>
-              <a:t> humidity = </a:t>
-            </a:r>
-            <a:r>
-              <a:rPr lang="en-US" sz="1400" dirty="0" err="1">
-                <a:solidFill>
-                  <a:srgbClr val="000000"/>
-                </a:solidFill>
-                <a:latin typeface="Consolas"/>
-                <a:ea typeface="Calibri"/>
-                <a:cs typeface="Times New Roman"/>
-              </a:rPr>
-              <a:t>GetHumidity</a:t>
-            </a:r>
-            <a:r>
-              <a:rPr lang="en-US" sz="1400" dirty="0">
-                <a:solidFill>
-                  <a:srgbClr val="000000"/>
-                </a:solidFill>
-                <a:latin typeface="Consolas"/>
-                <a:ea typeface="Calibri"/>
-                <a:cs typeface="Times New Roman"/>
-              </a:rPr>
-              <a:t>();</a:t>
-            </a:r>
-            <a:endParaRPr lang="ru-RU" sz="1400" dirty="0">
-              <a:ea typeface="Calibri"/>
-              <a:cs typeface="Times New Roman"/>
-            </a:endParaRPr>
-          </a:p>
-          <a:p>
-            <a:pPr defTabSz="447675">
-              <a:spcAft>
-                <a:spcPts val="0"/>
-              </a:spcAft>
-            </a:pPr>
-            <a:r>
-              <a:rPr lang="en-US" sz="1400" dirty="0">
-                <a:solidFill>
-                  <a:srgbClr val="000000"/>
-                </a:solidFill>
-                <a:latin typeface="Consolas"/>
-                <a:ea typeface="Calibri"/>
-                <a:cs typeface="Times New Roman"/>
-              </a:rPr>
-              <a:t>		</a:t>
-            </a:r>
-            <a:r>
-              <a:rPr lang="en-US" sz="1400" dirty="0">
-                <a:solidFill>
-                  <a:srgbClr val="0000FF"/>
-                </a:solidFill>
-                <a:latin typeface="Consolas"/>
-                <a:ea typeface="Calibri"/>
-                <a:cs typeface="Times New Roman"/>
-              </a:rPr>
-              <a:t>double</a:t>
-            </a:r>
-            <a:r>
-              <a:rPr lang="en-US" sz="1400" dirty="0">
-                <a:solidFill>
-                  <a:srgbClr val="000000"/>
-                </a:solidFill>
-                <a:latin typeface="Consolas"/>
-                <a:ea typeface="Calibri"/>
-                <a:cs typeface="Times New Roman"/>
-              </a:rPr>
-              <a:t> pressure = </a:t>
-            </a:r>
-            <a:r>
-              <a:rPr lang="en-US" sz="1400" dirty="0" err="1">
-                <a:solidFill>
-                  <a:srgbClr val="000000"/>
-                </a:solidFill>
-                <a:latin typeface="Consolas"/>
-                <a:ea typeface="Calibri"/>
-                <a:cs typeface="Times New Roman"/>
-              </a:rPr>
-              <a:t>GetPressure</a:t>
-            </a:r>
-            <a:r>
-              <a:rPr lang="en-US" sz="1400" dirty="0">
-                <a:solidFill>
-                  <a:srgbClr val="000000"/>
-                </a:solidFill>
-                <a:latin typeface="Consolas"/>
-                <a:ea typeface="Calibri"/>
-                <a:cs typeface="Times New Roman"/>
-              </a:rPr>
-              <a:t>();</a:t>
-            </a:r>
-            <a:endParaRPr lang="ru-RU" sz="1400" dirty="0">
-              <a:ea typeface="Calibri"/>
-              <a:cs typeface="Times New Roman"/>
-            </a:endParaRPr>
-          </a:p>
-          <a:p>
-            <a:pPr defTabSz="447675">
-              <a:spcAft>
-                <a:spcPts val="0"/>
-              </a:spcAft>
-            </a:pPr>
-            <a:r>
-              <a:rPr lang="en-US" sz="1400" dirty="0">
-                <a:solidFill>
-                  <a:srgbClr val="000000"/>
-                </a:solidFill>
-                <a:latin typeface="Consolas"/>
-                <a:ea typeface="Calibri"/>
-                <a:cs typeface="Times New Roman"/>
-              </a:rPr>
-              <a:t> </a:t>
-            </a:r>
-            <a:endParaRPr lang="ru-RU" sz="1400" dirty="0">
-              <a:solidFill>
-                <a:srgbClr val="000000"/>
-              </a:solidFill>
-              <a:latin typeface="Consolas"/>
-              <a:ea typeface="Calibri"/>
-              <a:cs typeface="Times New Roman"/>
-            </a:endParaRPr>
-          </a:p>
-          <a:p>
-            <a:pPr defTabSz="447675">
-              <a:spcAft>
-                <a:spcPts val="0"/>
-              </a:spcAft>
-            </a:pPr>
-            <a:r>
-              <a:rPr lang="ru-RU" sz="1400" dirty="0">
-                <a:solidFill>
-                  <a:srgbClr val="008000"/>
-                </a:solidFill>
-                <a:latin typeface="Consolas"/>
-                <a:ea typeface="Calibri"/>
-                <a:cs typeface="Times New Roman"/>
-              </a:rPr>
-              <a:t>		// Обновляем показания индикаторов</a:t>
-            </a:r>
-            <a:endParaRPr lang="ru-RU" sz="1400" dirty="0">
-              <a:ea typeface="Calibri"/>
-              <a:cs typeface="Times New Roman"/>
-            </a:endParaRPr>
-          </a:p>
-          <a:p>
-            <a:pPr defTabSz="447675">
-              <a:spcAft>
-                <a:spcPts val="0"/>
-              </a:spcAft>
-            </a:pPr>
-            <a:r>
-              <a:rPr lang="en-US" sz="1400" dirty="0">
-                <a:solidFill>
-                  <a:srgbClr val="000000"/>
-                </a:solidFill>
-                <a:latin typeface="Consolas"/>
-                <a:ea typeface="Calibri"/>
-                <a:cs typeface="Times New Roman"/>
-              </a:rPr>
-              <a:t>		</a:t>
-            </a:r>
-            <a:r>
-              <a:rPr lang="en-US" sz="1400" dirty="0" err="1">
-                <a:solidFill>
-                  <a:srgbClr val="000000"/>
-                </a:solidFill>
-                <a:latin typeface="Consolas"/>
-                <a:ea typeface="Calibri"/>
-                <a:cs typeface="Times New Roman"/>
-              </a:rPr>
-              <a:t>m_currentConditionsDisplay.Update</a:t>
-            </a:r>
-            <a:r>
-              <a:rPr lang="en-US" sz="1400" dirty="0">
-                <a:solidFill>
-                  <a:srgbClr val="000000"/>
-                </a:solidFill>
-                <a:latin typeface="Consolas"/>
-                <a:ea typeface="Calibri"/>
-                <a:cs typeface="Times New Roman"/>
-              </a:rPr>
-              <a:t>(temp, humidity, pressure);</a:t>
-            </a:r>
-            <a:endParaRPr lang="ru-RU" sz="1400" dirty="0">
-              <a:ea typeface="Calibri"/>
-              <a:cs typeface="Times New Roman"/>
-            </a:endParaRPr>
-          </a:p>
-          <a:p>
-            <a:pPr defTabSz="447675">
-              <a:spcAft>
-                <a:spcPts val="0"/>
-              </a:spcAft>
-            </a:pPr>
-            <a:r>
-              <a:rPr lang="en-US" sz="1400" dirty="0">
-                <a:solidFill>
-                  <a:srgbClr val="000000"/>
-                </a:solidFill>
-                <a:latin typeface="Consolas"/>
-                <a:ea typeface="Calibri"/>
-                <a:cs typeface="Times New Roman"/>
-              </a:rPr>
-              <a:t>		</a:t>
-            </a:r>
-            <a:r>
-              <a:rPr lang="en-US" sz="1400" dirty="0" err="1">
-                <a:solidFill>
-                  <a:srgbClr val="000000"/>
-                </a:solidFill>
-                <a:latin typeface="Consolas"/>
-                <a:ea typeface="Calibri"/>
-                <a:cs typeface="Times New Roman"/>
-              </a:rPr>
-              <a:t>m_statisticsDisplay.Update</a:t>
-            </a:r>
-            <a:r>
-              <a:rPr lang="en-US" sz="1400" dirty="0">
-                <a:solidFill>
-                  <a:srgbClr val="000000"/>
-                </a:solidFill>
-                <a:latin typeface="Consolas"/>
-                <a:ea typeface="Calibri"/>
-                <a:cs typeface="Times New Roman"/>
-              </a:rPr>
-              <a:t>(temp, humidity, pressure);</a:t>
-            </a:r>
-            <a:endParaRPr lang="ru-RU" sz="1400" dirty="0">
-              <a:ea typeface="Calibri"/>
-              <a:cs typeface="Times New Roman"/>
-            </a:endParaRPr>
-          </a:p>
-          <a:p>
-            <a:pPr defTabSz="447675">
-              <a:spcAft>
-                <a:spcPts val="0"/>
-              </a:spcAft>
-            </a:pPr>
-            <a:r>
-              <a:rPr lang="en-US" sz="1400" dirty="0">
-                <a:solidFill>
-                  <a:srgbClr val="000000"/>
-                </a:solidFill>
-                <a:latin typeface="Consolas"/>
-                <a:ea typeface="Calibri"/>
-                <a:cs typeface="Times New Roman"/>
-              </a:rPr>
-              <a:t>		</a:t>
-            </a:r>
-            <a:r>
-              <a:rPr lang="en-US" sz="1400" dirty="0" err="1">
-                <a:solidFill>
-                  <a:srgbClr val="000000"/>
-                </a:solidFill>
-                <a:latin typeface="Consolas"/>
-                <a:ea typeface="Calibri"/>
-                <a:cs typeface="Times New Roman"/>
-              </a:rPr>
-              <a:t>m_forecastDisplay.Update</a:t>
-            </a:r>
-            <a:r>
-              <a:rPr lang="en-US" sz="1400" dirty="0">
-                <a:solidFill>
-                  <a:srgbClr val="000000"/>
-                </a:solidFill>
-                <a:latin typeface="Consolas"/>
-                <a:ea typeface="Calibri"/>
-                <a:cs typeface="Times New Roman"/>
-              </a:rPr>
-              <a:t>(temp, humidity, pressure);</a:t>
-            </a:r>
-            <a:endParaRPr lang="ru-RU" sz="1400" dirty="0">
-              <a:ea typeface="Calibri"/>
-              <a:cs typeface="Times New Roman"/>
-            </a:endParaRPr>
-          </a:p>
-          <a:p>
-            <a:pPr defTabSz="447675">
-              <a:spcAft>
-                <a:spcPts val="0"/>
-              </a:spcAft>
-            </a:pPr>
-            <a:r>
-              <a:rPr lang="en-US" sz="1400" dirty="0">
-                <a:solidFill>
-                  <a:srgbClr val="000000"/>
-                </a:solidFill>
-                <a:latin typeface="Consolas"/>
-                <a:ea typeface="Calibri"/>
-                <a:cs typeface="Times New Roman"/>
-              </a:rPr>
-              <a:t>	}</a:t>
-            </a:r>
-            <a:endParaRPr lang="ru-RU" sz="1400" dirty="0">
-              <a:ea typeface="Calibri"/>
-              <a:cs typeface="Times New Roman"/>
-            </a:endParaRPr>
-          </a:p>
-          <a:p>
-            <a:pPr defTabSz="447675">
-              <a:spcAft>
-                <a:spcPts val="1000"/>
-              </a:spcAft>
-            </a:pPr>
-            <a:r>
-              <a:rPr lang="en-US" sz="1400" dirty="0">
-                <a:solidFill>
-                  <a:srgbClr val="0000FF"/>
-                </a:solidFill>
-                <a:latin typeface="Consolas"/>
-                <a:ea typeface="Calibri"/>
-                <a:cs typeface="Times New Roman"/>
-              </a:rPr>
-              <a:t>private</a:t>
-            </a:r>
-            <a:r>
-              <a:rPr lang="ru-RU" sz="1400" dirty="0">
-                <a:solidFill>
-                  <a:srgbClr val="000000"/>
-                </a:solidFill>
-                <a:latin typeface="Consolas"/>
-                <a:ea typeface="Calibri"/>
-                <a:cs typeface="Times New Roman"/>
-              </a:rPr>
-              <a:t>:</a:t>
-            </a:r>
-            <a:endParaRPr lang="en-US" sz="1400" dirty="0">
-              <a:solidFill>
-                <a:srgbClr val="000000"/>
-              </a:solidFill>
-              <a:latin typeface="Consolas"/>
-              <a:ea typeface="Calibri"/>
-              <a:cs typeface="Times New Roman"/>
-            </a:endParaRPr>
-          </a:p>
-          <a:p>
-            <a:pPr defTabSz="447675">
-              <a:spcAft>
-                <a:spcPts val="1000"/>
-              </a:spcAft>
-            </a:pPr>
-            <a:r>
-              <a:rPr lang="en-US" sz="1400" dirty="0">
-                <a:solidFill>
-                  <a:srgbClr val="008000"/>
-                </a:solidFill>
-                <a:latin typeface="Consolas"/>
-                <a:ea typeface="Calibri"/>
-                <a:cs typeface="Times New Roman"/>
-              </a:rPr>
-              <a:t>	</a:t>
-            </a:r>
-            <a:r>
-              <a:rPr lang="ru-RU" sz="1400" dirty="0">
-                <a:solidFill>
-                  <a:srgbClr val="008000"/>
-                </a:solidFill>
-                <a:latin typeface="Consolas"/>
-                <a:ea typeface="Calibri"/>
-                <a:cs typeface="Times New Roman"/>
-              </a:rPr>
-              <a:t>// объявления переменных-индикаторов</a:t>
-            </a:r>
-            <a:endParaRPr lang="ru-RU" sz="1400" dirty="0">
-              <a:ea typeface="Calibri"/>
-              <a:cs typeface="Times New Roman"/>
-            </a:endParaRPr>
-          </a:p>
-          <a:p>
-            <a:pPr defTabSz="447675">
-              <a:spcAft>
-                <a:spcPts val="1000"/>
-              </a:spcAft>
-            </a:pPr>
-            <a:r>
-              <a:rPr lang="ru-RU" sz="1400" dirty="0">
-                <a:solidFill>
-                  <a:srgbClr val="000000"/>
-                </a:solidFill>
-                <a:latin typeface="Consolas"/>
-                <a:ea typeface="Calibri"/>
-                <a:cs typeface="Times New Roman"/>
-              </a:rPr>
-              <a:t>};</a:t>
-            </a:r>
-            <a:endParaRPr lang="ru-RU" sz="1400" dirty="0">
-              <a:ea typeface="Calibri"/>
-              <a:cs typeface="Times New Roman"/>
-            </a:endParaRPr>
+            <a:r>
+              <a:rPr lang="ru-RU" dirty="0"/>
+              <a:t>Расширяемость</a:t>
+            </a:r>
+          </a:p>
+          <a:p>
+            <a:pPr lvl="1"/>
+            <a:r>
+              <a:rPr lang="ru-RU" dirty="0"/>
+              <a:t>Возможность реализации дополнительных экранов вывода</a:t>
+            </a:r>
+          </a:p>
+          <a:p>
+            <a:pPr lvl="1"/>
+            <a:r>
+              <a:rPr lang="ru-RU" dirty="0"/>
+              <a:t>Возможность динамического добавления и удаления экранов</a:t>
+            </a:r>
           </a:p>
         </p:txBody>
       </p:sp>
     </p:spTree>
     <p:extLst>
       <p:ext uri="{BB962C8B-B14F-4D97-AF65-F5344CB8AC3E}">
-        <p14:creationId xmlns:p14="http://schemas.microsoft.com/office/powerpoint/2010/main" val="2136106387"/>
+        <p14:creationId xmlns:p14="http://schemas.microsoft.com/office/powerpoint/2010/main" val="1428663581"/>
       </p:ext>
     </p:extLst>
   </p:cSld>
@@ -5904,7 +5194,7 @@
       </p:grpSpPr>
       <p:sp>
         <p:nvSpPr>
-          <p:cNvPr id="3" name="Заголовок 2"/>
+          <p:cNvPr id="2" name="Заголовок 1"/>
           <p:cNvSpPr>
             <a:spLocks noGrp="1"/>
           </p:cNvSpPr>
@@ -5914,122 +5204,768 @@
         </p:nvSpPr>
         <p:spPr/>
         <p:txBody>
-          <a:bodyPr>
-            <a:normAutofit fontScale="90000"/>
-          </a:bodyPr>
+          <a:bodyPr/>
           <a:lstStyle/>
           <a:p>
             <a:r>
               <a:rPr lang="ru-RU" dirty="0"/>
-              <a:t>Блиц-анализ наивной реализации</a:t>
+              <a:t>Наивная реализация</a:t>
             </a:r>
           </a:p>
         </p:txBody>
       </p:sp>
       <p:sp>
         <p:nvSpPr>
-          <p:cNvPr id="4" name="Объект 3"/>
-          <p:cNvSpPr>
-            <a:spLocks noGrp="1"/>
-          </p:cNvSpPr>
-          <p:nvPr>
-            <p:ph idx="1"/>
-          </p:nvPr>
+          <p:cNvPr id="4" name="Прямоугольник 3"/>
+          <p:cNvSpPr/>
+          <p:nvPr/>
         </p:nvSpPr>
-        <p:spPr/>
+        <p:spPr>
+          <a:xfrm>
+            <a:off x="198190" y="1916832"/>
+            <a:ext cx="8712968" cy="4226798"/>
+          </a:xfrm>
+          <a:prstGeom prst="rect">
+            <a:avLst/>
+          </a:prstGeom>
+        </p:spPr>
         <p:txBody>
-          <a:bodyPr>
-            <a:normAutofit fontScale="92500" lnSpcReduction="20000"/>
+          <a:bodyPr wrap="square">
+            <a:spAutoFit/>
           </a:bodyPr>
           <a:lstStyle/>
           <a:p>
-            <a:r>
-              <a:rPr lang="ru-RU" dirty="0"/>
-              <a:t>Какие из следующих утверждений относятся к данной реализации</a:t>
-            </a:r>
-            <a:r>
-              <a:rPr lang="en-US" dirty="0"/>
-              <a:t>?</a:t>
-            </a:r>
-            <a:endParaRPr lang="ru-RU" dirty="0"/>
-          </a:p>
-          <a:p>
-            <a:pPr lvl="1"/>
-            <a:r>
-              <a:rPr lang="en-US" dirty="0"/>
-              <a:t>A. </a:t>
-            </a:r>
-            <a:r>
-              <a:rPr lang="ru-RU" dirty="0"/>
-              <a:t>Программирование на уровне реализаций, а не интерфейсов</a:t>
-            </a:r>
-          </a:p>
-          <a:p>
-            <a:pPr lvl="1"/>
-            <a:r>
-              <a:rPr lang="en-US" dirty="0"/>
-              <a:t>B. </a:t>
-            </a:r>
-            <a:r>
-              <a:rPr lang="ru-RU" dirty="0"/>
-              <a:t>Для каждого нового элемента придется изменять код</a:t>
-            </a:r>
-          </a:p>
-          <a:p>
-            <a:pPr lvl="1"/>
-            <a:r>
-              <a:rPr lang="en-US" dirty="0"/>
-              <a:t>C. </a:t>
-            </a:r>
-            <a:r>
-              <a:rPr lang="ru-RU" dirty="0"/>
-              <a:t>Нельзя добавлять/удалять элементы во время выполнения</a:t>
-            </a:r>
-          </a:p>
-          <a:p>
-            <a:pPr lvl="1"/>
-            <a:r>
-              <a:rPr lang="en-US" dirty="0"/>
-              <a:t>D. </a:t>
-            </a:r>
-            <a:r>
-              <a:rPr lang="ru-RU" dirty="0"/>
-              <a:t>Элементы не реализуют единый интерфейс</a:t>
-            </a:r>
-          </a:p>
-          <a:p>
-            <a:pPr lvl="1"/>
-            <a:r>
-              <a:rPr lang="en-US" dirty="0"/>
-              <a:t>E. </a:t>
-            </a:r>
-            <a:r>
-              <a:rPr lang="ru-RU" dirty="0"/>
-              <a:t>Переменные аспекты архитектуры не инкапсулируются</a:t>
-            </a:r>
-          </a:p>
-          <a:p>
-            <a:pPr lvl="1"/>
-            <a:r>
-              <a:rPr lang="en-US" dirty="0"/>
-              <a:t>F. </a:t>
-            </a:r>
-            <a:r>
-              <a:rPr lang="ru-RU" dirty="0"/>
-              <a:t>Нарушается инкапсуляция класса </a:t>
-            </a:r>
-            <a:r>
-              <a:rPr lang="en-US" dirty="0" err="1"/>
-              <a:t>WeatherData</a:t>
-            </a:r>
-            <a:endParaRPr lang="ru-RU" dirty="0"/>
+            <a:pPr defTabSz="447675">
+              <a:spcAft>
+                <a:spcPts val="0"/>
+              </a:spcAft>
+            </a:pPr>
+            <a:r>
+              <a:rPr lang="ru-RU" sz="1400" dirty="0" err="1">
+                <a:solidFill>
+                  <a:srgbClr val="0000FF"/>
+                </a:solidFill>
+                <a:latin typeface="Consolas"/>
+                <a:ea typeface="Calibri"/>
+                <a:cs typeface="Times New Roman"/>
+              </a:rPr>
+              <a:t>class</a:t>
+            </a:r>
+            <a:r>
+              <a:rPr lang="ru-RU" sz="1400" dirty="0">
+                <a:solidFill>
+                  <a:srgbClr val="000000"/>
+                </a:solidFill>
+                <a:latin typeface="Consolas"/>
+                <a:ea typeface="Calibri"/>
+                <a:cs typeface="Times New Roman"/>
+              </a:rPr>
+              <a:t> </a:t>
+            </a:r>
+            <a:r>
+              <a:rPr lang="ru-RU" sz="1400" dirty="0" err="1">
+                <a:solidFill>
+                  <a:srgbClr val="2B91AF"/>
+                </a:solidFill>
+                <a:latin typeface="Consolas"/>
+                <a:ea typeface="Calibri"/>
+                <a:cs typeface="Times New Roman"/>
+              </a:rPr>
+              <a:t>CWeatherData</a:t>
+            </a:r>
+            <a:endParaRPr lang="ru-RU" sz="1400" dirty="0">
+              <a:ea typeface="Calibri"/>
+              <a:cs typeface="Times New Roman"/>
+            </a:endParaRPr>
+          </a:p>
+          <a:p>
+            <a:pPr defTabSz="447675">
+              <a:spcAft>
+                <a:spcPts val="0"/>
+              </a:spcAft>
+            </a:pPr>
+            <a:r>
+              <a:rPr lang="ru-RU" sz="1400" dirty="0">
+                <a:solidFill>
+                  <a:srgbClr val="000000"/>
+                </a:solidFill>
+                <a:latin typeface="Consolas"/>
+                <a:ea typeface="Calibri"/>
+                <a:cs typeface="Times New Roman"/>
+              </a:rPr>
+              <a:t>{</a:t>
+            </a:r>
+            <a:endParaRPr lang="ru-RU" sz="1400" dirty="0">
+              <a:ea typeface="Calibri"/>
+              <a:cs typeface="Times New Roman"/>
+            </a:endParaRPr>
+          </a:p>
+          <a:p>
+            <a:pPr defTabSz="447675">
+              <a:spcAft>
+                <a:spcPts val="0"/>
+              </a:spcAft>
+            </a:pPr>
+            <a:r>
+              <a:rPr lang="ru-RU" sz="1400" dirty="0" err="1">
+                <a:solidFill>
+                  <a:srgbClr val="0000FF"/>
+                </a:solidFill>
+                <a:latin typeface="Consolas"/>
+                <a:ea typeface="Calibri"/>
+                <a:cs typeface="Times New Roman"/>
+              </a:rPr>
+              <a:t>public</a:t>
+            </a:r>
+            <a:r>
+              <a:rPr lang="ru-RU" sz="1400" dirty="0">
+                <a:solidFill>
+                  <a:srgbClr val="000000"/>
+                </a:solidFill>
+                <a:latin typeface="Consolas"/>
+                <a:ea typeface="Calibri"/>
+                <a:cs typeface="Times New Roman"/>
+              </a:rPr>
+              <a:t>:</a:t>
+            </a:r>
+            <a:endParaRPr lang="ru-RU" sz="1400" dirty="0">
+              <a:ea typeface="Calibri"/>
+              <a:cs typeface="Times New Roman"/>
+            </a:endParaRPr>
+          </a:p>
+          <a:p>
+            <a:pPr defTabSz="447675">
+              <a:spcAft>
+                <a:spcPts val="0"/>
+              </a:spcAft>
+            </a:pPr>
+            <a:r>
+              <a:rPr lang="en-US" sz="1400" dirty="0">
+                <a:solidFill>
+                  <a:srgbClr val="000000"/>
+                </a:solidFill>
+                <a:latin typeface="Consolas"/>
+                <a:ea typeface="Calibri"/>
+                <a:cs typeface="Times New Roman"/>
+              </a:rPr>
+              <a:t>	</a:t>
+            </a:r>
+            <a:r>
+              <a:rPr lang="en-US" sz="1400" dirty="0">
+                <a:solidFill>
+                  <a:srgbClr val="0000FF"/>
+                </a:solidFill>
+                <a:latin typeface="Consolas"/>
+                <a:ea typeface="Calibri"/>
+                <a:cs typeface="Times New Roman"/>
+              </a:rPr>
+              <a:t>void</a:t>
+            </a:r>
+            <a:r>
+              <a:rPr lang="en-US" sz="1400" dirty="0">
+                <a:solidFill>
+                  <a:srgbClr val="000000"/>
+                </a:solidFill>
+                <a:latin typeface="Consolas"/>
+                <a:ea typeface="Calibri"/>
+                <a:cs typeface="Times New Roman"/>
+              </a:rPr>
+              <a:t> </a:t>
+            </a:r>
+            <a:r>
+              <a:rPr lang="en-US" sz="1400" dirty="0" err="1">
+                <a:solidFill>
+                  <a:srgbClr val="000000"/>
+                </a:solidFill>
+                <a:latin typeface="Consolas"/>
+                <a:ea typeface="Calibri"/>
+                <a:cs typeface="Times New Roman"/>
+              </a:rPr>
+              <a:t>MeasurementsChanged</a:t>
+            </a:r>
+            <a:r>
+              <a:rPr lang="en-US" sz="1400" dirty="0">
+                <a:solidFill>
+                  <a:srgbClr val="000000"/>
+                </a:solidFill>
+                <a:latin typeface="Consolas"/>
+                <a:ea typeface="Calibri"/>
+                <a:cs typeface="Times New Roman"/>
+              </a:rPr>
+              <a:t>()</a:t>
+            </a:r>
+            <a:endParaRPr lang="ru-RU" sz="1400" dirty="0">
+              <a:ea typeface="Calibri"/>
+              <a:cs typeface="Times New Roman"/>
+            </a:endParaRPr>
+          </a:p>
+          <a:p>
+            <a:pPr defTabSz="447675">
+              <a:spcAft>
+                <a:spcPts val="0"/>
+              </a:spcAft>
+            </a:pPr>
+            <a:r>
+              <a:rPr lang="en-US" sz="1400" dirty="0">
+                <a:solidFill>
+                  <a:srgbClr val="000000"/>
+                </a:solidFill>
+                <a:latin typeface="Consolas"/>
+                <a:ea typeface="Calibri"/>
+                <a:cs typeface="Times New Roman"/>
+              </a:rPr>
+              <a:t>	{</a:t>
+            </a:r>
+          </a:p>
+          <a:p>
+            <a:pPr defTabSz="447675">
+              <a:spcAft>
+                <a:spcPts val="0"/>
+              </a:spcAft>
+            </a:pPr>
+            <a:r>
+              <a:rPr lang="en-US" sz="1400" dirty="0">
+                <a:ea typeface="Calibri"/>
+                <a:cs typeface="Times New Roman"/>
+              </a:rPr>
+              <a:t>		</a:t>
+            </a:r>
+            <a:r>
+              <a:rPr lang="ru-RU" sz="1400" dirty="0">
+                <a:solidFill>
+                  <a:srgbClr val="008000"/>
+                </a:solidFill>
+                <a:latin typeface="Consolas"/>
+                <a:ea typeface="Calibri"/>
+                <a:cs typeface="Times New Roman"/>
+              </a:rPr>
+              <a:t> // Для получения данных вызываем уже реализованные </a:t>
+            </a:r>
+            <a:r>
+              <a:rPr lang="en-US" sz="1400" dirty="0">
+                <a:solidFill>
+                  <a:srgbClr val="008000"/>
+                </a:solidFill>
+                <a:latin typeface="Consolas"/>
+                <a:ea typeface="Calibri"/>
+                <a:cs typeface="Times New Roman"/>
+              </a:rPr>
+              <a:t>getter-</a:t>
+            </a:r>
+            <a:r>
+              <a:rPr lang="ru-RU" sz="1400" dirty="0">
+                <a:solidFill>
+                  <a:srgbClr val="008000"/>
+                </a:solidFill>
+                <a:latin typeface="Consolas"/>
+                <a:ea typeface="Calibri"/>
+                <a:cs typeface="Times New Roman"/>
+              </a:rPr>
+              <a:t>ы</a:t>
+            </a:r>
+            <a:endParaRPr lang="ru-RU" sz="1400" dirty="0">
+              <a:ea typeface="Calibri"/>
+              <a:cs typeface="Times New Roman"/>
+            </a:endParaRPr>
+          </a:p>
+          <a:p>
+            <a:pPr defTabSz="447675">
+              <a:spcAft>
+                <a:spcPts val="0"/>
+              </a:spcAft>
+            </a:pPr>
+            <a:r>
+              <a:rPr lang="en-US" sz="1400" dirty="0">
+                <a:solidFill>
+                  <a:srgbClr val="000000"/>
+                </a:solidFill>
+                <a:latin typeface="Consolas"/>
+                <a:ea typeface="Calibri"/>
+                <a:cs typeface="Times New Roman"/>
+              </a:rPr>
+              <a:t>		</a:t>
+            </a:r>
+            <a:r>
+              <a:rPr lang="en-US" sz="1400" dirty="0">
+                <a:solidFill>
+                  <a:srgbClr val="0000FF"/>
+                </a:solidFill>
+                <a:latin typeface="Consolas"/>
+                <a:ea typeface="Calibri"/>
+                <a:cs typeface="Times New Roman"/>
+              </a:rPr>
+              <a:t>double</a:t>
+            </a:r>
+            <a:r>
+              <a:rPr lang="en-US" sz="1400" dirty="0">
+                <a:solidFill>
+                  <a:srgbClr val="000000"/>
+                </a:solidFill>
+                <a:latin typeface="Consolas"/>
+                <a:ea typeface="Calibri"/>
+                <a:cs typeface="Times New Roman"/>
+              </a:rPr>
+              <a:t> temp = </a:t>
+            </a:r>
+            <a:r>
+              <a:rPr lang="en-US" sz="1400" dirty="0" err="1">
+                <a:solidFill>
+                  <a:srgbClr val="000000"/>
+                </a:solidFill>
+                <a:latin typeface="Consolas"/>
+                <a:ea typeface="Calibri"/>
+                <a:cs typeface="Times New Roman"/>
+              </a:rPr>
+              <a:t>GetTemperature</a:t>
+            </a:r>
+            <a:r>
+              <a:rPr lang="en-US" sz="1400" dirty="0">
+                <a:solidFill>
+                  <a:srgbClr val="000000"/>
+                </a:solidFill>
+                <a:latin typeface="Consolas"/>
+                <a:ea typeface="Calibri"/>
+                <a:cs typeface="Times New Roman"/>
+              </a:rPr>
+              <a:t>();</a:t>
+            </a:r>
+            <a:endParaRPr lang="ru-RU" sz="1400" dirty="0">
+              <a:ea typeface="Calibri"/>
+              <a:cs typeface="Times New Roman"/>
+            </a:endParaRPr>
+          </a:p>
+          <a:p>
+            <a:pPr defTabSz="447675">
+              <a:spcAft>
+                <a:spcPts val="0"/>
+              </a:spcAft>
+            </a:pPr>
+            <a:r>
+              <a:rPr lang="en-US" sz="1400" dirty="0">
+                <a:solidFill>
+                  <a:srgbClr val="000000"/>
+                </a:solidFill>
+                <a:latin typeface="Consolas"/>
+                <a:ea typeface="Calibri"/>
+                <a:cs typeface="Times New Roman"/>
+              </a:rPr>
+              <a:t>		</a:t>
+            </a:r>
+            <a:r>
+              <a:rPr lang="en-US" sz="1400" dirty="0">
+                <a:solidFill>
+                  <a:srgbClr val="0000FF"/>
+                </a:solidFill>
+                <a:latin typeface="Consolas"/>
+                <a:ea typeface="Calibri"/>
+                <a:cs typeface="Times New Roman"/>
+              </a:rPr>
+              <a:t>double</a:t>
+            </a:r>
+            <a:r>
+              <a:rPr lang="en-US" sz="1400" dirty="0">
+                <a:solidFill>
+                  <a:srgbClr val="000000"/>
+                </a:solidFill>
+                <a:latin typeface="Consolas"/>
+                <a:ea typeface="Calibri"/>
+                <a:cs typeface="Times New Roman"/>
+              </a:rPr>
+              <a:t> humidity = </a:t>
+            </a:r>
+            <a:r>
+              <a:rPr lang="en-US" sz="1400" dirty="0" err="1">
+                <a:solidFill>
+                  <a:srgbClr val="000000"/>
+                </a:solidFill>
+                <a:latin typeface="Consolas"/>
+                <a:ea typeface="Calibri"/>
+                <a:cs typeface="Times New Roman"/>
+              </a:rPr>
+              <a:t>GetHumidity</a:t>
+            </a:r>
+            <a:r>
+              <a:rPr lang="en-US" sz="1400" dirty="0">
+                <a:solidFill>
+                  <a:srgbClr val="000000"/>
+                </a:solidFill>
+                <a:latin typeface="Consolas"/>
+                <a:ea typeface="Calibri"/>
+                <a:cs typeface="Times New Roman"/>
+              </a:rPr>
+              <a:t>();</a:t>
+            </a:r>
+            <a:endParaRPr lang="ru-RU" sz="1400" dirty="0">
+              <a:ea typeface="Calibri"/>
+              <a:cs typeface="Times New Roman"/>
+            </a:endParaRPr>
+          </a:p>
+          <a:p>
+            <a:pPr defTabSz="447675">
+              <a:spcAft>
+                <a:spcPts val="0"/>
+              </a:spcAft>
+            </a:pPr>
+            <a:r>
+              <a:rPr lang="en-US" sz="1400" dirty="0">
+                <a:solidFill>
+                  <a:srgbClr val="000000"/>
+                </a:solidFill>
+                <a:latin typeface="Consolas"/>
+                <a:ea typeface="Calibri"/>
+                <a:cs typeface="Times New Roman"/>
+              </a:rPr>
+              <a:t>		</a:t>
+            </a:r>
+            <a:r>
+              <a:rPr lang="en-US" sz="1400" dirty="0">
+                <a:solidFill>
+                  <a:srgbClr val="0000FF"/>
+                </a:solidFill>
+                <a:latin typeface="Consolas"/>
+                <a:ea typeface="Calibri"/>
+                <a:cs typeface="Times New Roman"/>
+              </a:rPr>
+              <a:t>double</a:t>
+            </a:r>
+            <a:r>
+              <a:rPr lang="en-US" sz="1400" dirty="0">
+                <a:solidFill>
+                  <a:srgbClr val="000000"/>
+                </a:solidFill>
+                <a:latin typeface="Consolas"/>
+                <a:ea typeface="Calibri"/>
+                <a:cs typeface="Times New Roman"/>
+              </a:rPr>
+              <a:t> pressure = </a:t>
+            </a:r>
+            <a:r>
+              <a:rPr lang="en-US" sz="1400" dirty="0" err="1">
+                <a:solidFill>
+                  <a:srgbClr val="000000"/>
+                </a:solidFill>
+                <a:latin typeface="Consolas"/>
+                <a:ea typeface="Calibri"/>
+                <a:cs typeface="Times New Roman"/>
+              </a:rPr>
+              <a:t>GetPressure</a:t>
+            </a:r>
+            <a:r>
+              <a:rPr lang="en-US" sz="1400" dirty="0">
+                <a:solidFill>
+                  <a:srgbClr val="000000"/>
+                </a:solidFill>
+                <a:latin typeface="Consolas"/>
+                <a:ea typeface="Calibri"/>
+                <a:cs typeface="Times New Roman"/>
+              </a:rPr>
+              <a:t>();</a:t>
+            </a:r>
+            <a:endParaRPr lang="ru-RU" sz="1400" dirty="0">
+              <a:ea typeface="Calibri"/>
+              <a:cs typeface="Times New Roman"/>
+            </a:endParaRPr>
+          </a:p>
+          <a:p>
+            <a:pPr defTabSz="447675">
+              <a:spcAft>
+                <a:spcPts val="0"/>
+              </a:spcAft>
+            </a:pPr>
+            <a:r>
+              <a:rPr lang="en-US" sz="1400" dirty="0">
+                <a:solidFill>
+                  <a:srgbClr val="000000"/>
+                </a:solidFill>
+                <a:latin typeface="Consolas"/>
+                <a:ea typeface="Calibri"/>
+                <a:cs typeface="Times New Roman"/>
+              </a:rPr>
+              <a:t> </a:t>
+            </a:r>
+            <a:endParaRPr lang="ru-RU" sz="1400" dirty="0">
+              <a:solidFill>
+                <a:srgbClr val="000000"/>
+              </a:solidFill>
+              <a:latin typeface="Consolas"/>
+              <a:ea typeface="Calibri"/>
+              <a:cs typeface="Times New Roman"/>
+            </a:endParaRPr>
+          </a:p>
+          <a:p>
+            <a:pPr defTabSz="447675">
+              <a:spcAft>
+                <a:spcPts val="0"/>
+              </a:spcAft>
+            </a:pPr>
+            <a:r>
+              <a:rPr lang="ru-RU" sz="1400" dirty="0">
+                <a:solidFill>
+                  <a:srgbClr val="008000"/>
+                </a:solidFill>
+                <a:latin typeface="Consolas"/>
+                <a:ea typeface="Calibri"/>
+                <a:cs typeface="Times New Roman"/>
+              </a:rPr>
+              <a:t>		// Обновляем показания индикаторов</a:t>
+            </a:r>
+            <a:endParaRPr lang="ru-RU" sz="1400" dirty="0">
+              <a:ea typeface="Calibri"/>
+              <a:cs typeface="Times New Roman"/>
+            </a:endParaRPr>
+          </a:p>
+          <a:p>
+            <a:pPr defTabSz="447675">
+              <a:spcAft>
+                <a:spcPts val="0"/>
+              </a:spcAft>
+            </a:pPr>
+            <a:r>
+              <a:rPr lang="en-US" sz="1400" dirty="0">
+                <a:solidFill>
+                  <a:srgbClr val="000000"/>
+                </a:solidFill>
+                <a:latin typeface="Consolas"/>
+                <a:ea typeface="Calibri"/>
+                <a:cs typeface="Times New Roman"/>
+              </a:rPr>
+              <a:t>		</a:t>
+            </a:r>
+            <a:r>
+              <a:rPr lang="en-US" sz="1400" dirty="0" err="1">
+                <a:solidFill>
+                  <a:srgbClr val="000000"/>
+                </a:solidFill>
+                <a:latin typeface="Consolas"/>
+                <a:ea typeface="Calibri"/>
+                <a:cs typeface="Times New Roman"/>
+              </a:rPr>
+              <a:t>m_currentConditionsDisplay.Update</a:t>
+            </a:r>
+            <a:r>
+              <a:rPr lang="en-US" sz="1400" dirty="0">
+                <a:solidFill>
+                  <a:srgbClr val="000000"/>
+                </a:solidFill>
+                <a:latin typeface="Consolas"/>
+                <a:ea typeface="Calibri"/>
+                <a:cs typeface="Times New Roman"/>
+              </a:rPr>
+              <a:t>(temp, humidity, pressure);</a:t>
+            </a:r>
+            <a:endParaRPr lang="ru-RU" sz="1400" dirty="0">
+              <a:ea typeface="Calibri"/>
+              <a:cs typeface="Times New Roman"/>
+            </a:endParaRPr>
+          </a:p>
+          <a:p>
+            <a:pPr defTabSz="447675">
+              <a:spcAft>
+                <a:spcPts val="0"/>
+              </a:spcAft>
+            </a:pPr>
+            <a:r>
+              <a:rPr lang="en-US" sz="1400" dirty="0">
+                <a:solidFill>
+                  <a:srgbClr val="000000"/>
+                </a:solidFill>
+                <a:latin typeface="Consolas"/>
+                <a:ea typeface="Calibri"/>
+                <a:cs typeface="Times New Roman"/>
+              </a:rPr>
+              <a:t>		</a:t>
+            </a:r>
+            <a:r>
+              <a:rPr lang="en-US" sz="1400" dirty="0" err="1">
+                <a:solidFill>
+                  <a:srgbClr val="000000"/>
+                </a:solidFill>
+                <a:latin typeface="Consolas"/>
+                <a:ea typeface="Calibri"/>
+                <a:cs typeface="Times New Roman"/>
+              </a:rPr>
+              <a:t>m_statisticsDisplay.Update</a:t>
+            </a:r>
+            <a:r>
+              <a:rPr lang="en-US" sz="1400" dirty="0">
+                <a:solidFill>
+                  <a:srgbClr val="000000"/>
+                </a:solidFill>
+                <a:latin typeface="Consolas"/>
+                <a:ea typeface="Calibri"/>
+                <a:cs typeface="Times New Roman"/>
+              </a:rPr>
+              <a:t>(temp, humidity, pressure);</a:t>
+            </a:r>
+            <a:endParaRPr lang="ru-RU" sz="1400" dirty="0">
+              <a:ea typeface="Calibri"/>
+              <a:cs typeface="Times New Roman"/>
+            </a:endParaRPr>
+          </a:p>
+          <a:p>
+            <a:pPr defTabSz="447675">
+              <a:spcAft>
+                <a:spcPts val="0"/>
+              </a:spcAft>
+            </a:pPr>
+            <a:r>
+              <a:rPr lang="en-US" sz="1400" dirty="0">
+                <a:solidFill>
+                  <a:srgbClr val="000000"/>
+                </a:solidFill>
+                <a:latin typeface="Consolas"/>
+                <a:ea typeface="Calibri"/>
+                <a:cs typeface="Times New Roman"/>
+              </a:rPr>
+              <a:t>		</a:t>
+            </a:r>
+            <a:r>
+              <a:rPr lang="en-US" sz="1400" dirty="0" err="1">
+                <a:solidFill>
+                  <a:srgbClr val="000000"/>
+                </a:solidFill>
+                <a:latin typeface="Consolas"/>
+                <a:ea typeface="Calibri"/>
+                <a:cs typeface="Times New Roman"/>
+              </a:rPr>
+              <a:t>m_forecastDisplay.Update</a:t>
+            </a:r>
+            <a:r>
+              <a:rPr lang="en-US" sz="1400" dirty="0">
+                <a:solidFill>
+                  <a:srgbClr val="000000"/>
+                </a:solidFill>
+                <a:latin typeface="Consolas"/>
+                <a:ea typeface="Calibri"/>
+                <a:cs typeface="Times New Roman"/>
+              </a:rPr>
+              <a:t>(temp, humidity, pressure);</a:t>
+            </a:r>
+            <a:endParaRPr lang="ru-RU" sz="1400" dirty="0">
+              <a:ea typeface="Calibri"/>
+              <a:cs typeface="Times New Roman"/>
+            </a:endParaRPr>
+          </a:p>
+          <a:p>
+            <a:pPr defTabSz="447675">
+              <a:spcAft>
+                <a:spcPts val="0"/>
+              </a:spcAft>
+            </a:pPr>
+            <a:r>
+              <a:rPr lang="en-US" sz="1400" dirty="0">
+                <a:solidFill>
+                  <a:srgbClr val="000000"/>
+                </a:solidFill>
+                <a:latin typeface="Consolas"/>
+                <a:ea typeface="Calibri"/>
+                <a:cs typeface="Times New Roman"/>
+              </a:rPr>
+              <a:t>	}</a:t>
+            </a:r>
+            <a:endParaRPr lang="ru-RU" sz="1400" dirty="0">
+              <a:ea typeface="Calibri"/>
+              <a:cs typeface="Times New Roman"/>
+            </a:endParaRPr>
+          </a:p>
+          <a:p>
+            <a:pPr defTabSz="447675">
+              <a:spcAft>
+                <a:spcPts val="1000"/>
+              </a:spcAft>
+            </a:pPr>
+            <a:r>
+              <a:rPr lang="en-US" sz="1400" dirty="0">
+                <a:solidFill>
+                  <a:srgbClr val="0000FF"/>
+                </a:solidFill>
+                <a:latin typeface="Consolas"/>
+                <a:ea typeface="Calibri"/>
+                <a:cs typeface="Times New Roman"/>
+              </a:rPr>
+              <a:t>private</a:t>
+            </a:r>
+            <a:r>
+              <a:rPr lang="ru-RU" sz="1400" dirty="0">
+                <a:solidFill>
+                  <a:srgbClr val="000000"/>
+                </a:solidFill>
+                <a:latin typeface="Consolas"/>
+                <a:ea typeface="Calibri"/>
+                <a:cs typeface="Times New Roman"/>
+              </a:rPr>
+              <a:t>:</a:t>
+            </a:r>
+            <a:endParaRPr lang="en-US" sz="1400" dirty="0">
+              <a:solidFill>
+                <a:srgbClr val="000000"/>
+              </a:solidFill>
+              <a:latin typeface="Consolas"/>
+              <a:ea typeface="Calibri"/>
+              <a:cs typeface="Times New Roman"/>
+            </a:endParaRPr>
+          </a:p>
+          <a:p>
+            <a:pPr defTabSz="447675">
+              <a:spcAft>
+                <a:spcPts val="1000"/>
+              </a:spcAft>
+            </a:pPr>
+            <a:r>
+              <a:rPr lang="en-US" sz="1400" dirty="0">
+                <a:solidFill>
+                  <a:srgbClr val="008000"/>
+                </a:solidFill>
+                <a:latin typeface="Consolas"/>
+                <a:ea typeface="Calibri"/>
+                <a:cs typeface="Times New Roman"/>
+              </a:rPr>
+              <a:t>	</a:t>
+            </a:r>
+            <a:r>
+              <a:rPr lang="ru-RU" sz="1400" dirty="0">
+                <a:solidFill>
+                  <a:srgbClr val="008000"/>
+                </a:solidFill>
+                <a:latin typeface="Consolas"/>
+                <a:ea typeface="Calibri"/>
+                <a:cs typeface="Times New Roman"/>
+              </a:rPr>
+              <a:t>// объявления переменных-индикаторов</a:t>
+            </a:r>
+            <a:endParaRPr lang="ru-RU" sz="1400" dirty="0">
+              <a:ea typeface="Calibri"/>
+              <a:cs typeface="Times New Roman"/>
+            </a:endParaRPr>
+          </a:p>
+          <a:p>
+            <a:pPr defTabSz="447675">
+              <a:spcAft>
+                <a:spcPts val="1000"/>
+              </a:spcAft>
+            </a:pPr>
+            <a:r>
+              <a:rPr lang="ru-RU" sz="1400" dirty="0">
+                <a:solidFill>
+                  <a:srgbClr val="000000"/>
+                </a:solidFill>
+                <a:latin typeface="Consolas"/>
+                <a:ea typeface="Calibri"/>
+                <a:cs typeface="Times New Roman"/>
+              </a:rPr>
+              <a:t>};</a:t>
+            </a:r>
+            <a:endParaRPr lang="ru-RU" sz="1400" dirty="0">
+              <a:ea typeface="Calibri"/>
+              <a:cs typeface="Times New Roman"/>
+            </a:endParaRPr>
           </a:p>
         </p:txBody>
       </p:sp>
     </p:spTree>
     <p:extLst>
       <p:ext uri="{BB962C8B-B14F-4D97-AF65-F5344CB8AC3E}">
-        <p14:creationId xmlns:p14="http://schemas.microsoft.com/office/powerpoint/2010/main" val="351695254"/>
+        <p14:creationId xmlns:p14="http://schemas.microsoft.com/office/powerpoint/2010/main" val="2136106387"/>
       </p:ext>
     </p:extLst>
   </p:cSld>
@@ -6075,7 +6011,7 @@
           <a:p>
             <a:r>
               <a:rPr lang="ru-RU" dirty="0"/>
-              <a:t>Блиц-анализ наивной реализации (ответы)</a:t>
+              <a:t>Блиц-анализ наивной реализации</a:t>
             </a:r>
           </a:p>
         </p:txBody>
@@ -6101,6 +6037,160 @@
               <a:rPr lang="ru-RU" dirty="0"/>
               <a:t>Какие из следующих утверждений относятся к данной реализации</a:t>
             </a:r>
+            <a:r>
+              <a:rPr lang="en-US" dirty="0"/>
+              <a:t>?</a:t>
+            </a:r>
+            <a:endParaRPr lang="ru-RU" dirty="0"/>
+          </a:p>
+          <a:p>
+            <a:pPr lvl="1"/>
+            <a:r>
+              <a:rPr lang="en-US" dirty="0"/>
+              <a:t>A. </a:t>
+            </a:r>
+            <a:r>
+              <a:rPr lang="ru-RU" dirty="0"/>
+              <a:t>Программирование на уровне реализаций, а не интерфейсов</a:t>
+            </a:r>
+          </a:p>
+          <a:p>
+            <a:pPr lvl="1"/>
+            <a:r>
+              <a:rPr lang="en-US" dirty="0"/>
+              <a:t>B. </a:t>
+            </a:r>
+            <a:r>
+              <a:rPr lang="ru-RU" dirty="0"/>
+              <a:t>Для каждого нового элемента придется изменять код</a:t>
+            </a:r>
+          </a:p>
+          <a:p>
+            <a:pPr lvl="1"/>
+            <a:r>
+              <a:rPr lang="en-US" dirty="0"/>
+              <a:t>C. </a:t>
+            </a:r>
+            <a:r>
+              <a:rPr lang="ru-RU" dirty="0"/>
+              <a:t>Нельзя добавлять/удалять элементы во время выполнения</a:t>
+            </a:r>
+          </a:p>
+          <a:p>
+            <a:pPr lvl="1"/>
+            <a:r>
+              <a:rPr lang="en-US" dirty="0"/>
+              <a:t>D. </a:t>
+            </a:r>
+            <a:r>
+              <a:rPr lang="ru-RU" dirty="0"/>
+              <a:t>Элементы не реализуют единый интерфейс</a:t>
+            </a:r>
+          </a:p>
+          <a:p>
+            <a:pPr lvl="1"/>
+            <a:r>
+              <a:rPr lang="en-US" dirty="0"/>
+              <a:t>E. </a:t>
+            </a:r>
+            <a:r>
+              <a:rPr lang="ru-RU" dirty="0"/>
+              <a:t>Переменные аспекты архитектуры не инкапсулируются</a:t>
+            </a:r>
+          </a:p>
+          <a:p>
+            <a:pPr lvl="1"/>
+            <a:r>
+              <a:rPr lang="en-US" dirty="0"/>
+              <a:t>F. </a:t>
+            </a:r>
+            <a:r>
+              <a:rPr lang="ru-RU" dirty="0"/>
+              <a:t>Нарушается инкапсуляция класса </a:t>
+            </a:r>
+            <a:r>
+              <a:rPr lang="en-US" dirty="0" err="1"/>
+              <a:t>WeatherData</a:t>
+            </a:r>
+            <a:endParaRPr lang="ru-RU" dirty="0"/>
+          </a:p>
+        </p:txBody>
+      </p:sp>
+    </p:spTree>
+    <p:extLst>
+      <p:ext uri="{BB962C8B-B14F-4D97-AF65-F5344CB8AC3E}">
+        <p14:creationId xmlns:p14="http://schemas.microsoft.com/office/powerpoint/2010/main" val="351695254"/>
+      </p:ext>
+    </p:extLst>
+  </p:cSld>
+  <p:clrMapOvr>
+    <a:masterClrMapping/>
+  </p:clrMapOvr>
+</p:sld>
+</file>
+
+<file path=ppt/slides/slide13.xml><?xml version="1.0" encoding="utf-8"?>
+<p:sld xmlns:a="http://schemas.openxmlformats.org/drawingml/2006/main" xmlns:r="http://schemas.openxmlformats.org/officeDocument/2006/relationships" xmlns:p="http://schemas.openxmlformats.org/presentationml/2006/main">
+  <p:cSld>
+    <p:spTree>
+      <p:nvGrpSpPr>
+        <p:cNvPr id="1" name=""/>
+        <p:cNvGrpSpPr/>
+        <p:nvPr/>
+      </p:nvGrpSpPr>
+      <p:grpSpPr>
+        <a:xfrm>
+          <a:off x="0" y="0"/>
+          <a:ext cx="0" cy="0"/>
+          <a:chOff x="0" y="0"/>
+          <a:chExt cx="0" cy="0"/>
+        </a:xfrm>
+      </p:grpSpPr>
+      <p:sp>
+        <p:nvSpPr>
+          <p:cNvPr id="3" name="Заголовок 2"/>
+          <p:cNvSpPr>
+            <a:spLocks noGrp="1"/>
+          </p:cNvSpPr>
+          <p:nvPr>
+            <p:ph type="title"/>
+          </p:nvPr>
+        </p:nvSpPr>
+        <p:spPr/>
+        <p:txBody>
+          <a:bodyPr>
+            <a:normAutofit fontScale="90000"/>
+          </a:bodyPr>
+          <a:lstStyle/>
+          <a:p>
+            <a:r>
+              <a:rPr lang="ru-RU" dirty="0"/>
+              <a:t>Блиц-анализ наивной реализации (ответы)</a:t>
+            </a:r>
+          </a:p>
+        </p:txBody>
+      </p:sp>
+      <p:sp>
+        <p:nvSpPr>
+          <p:cNvPr id="4" name="Объект 3"/>
+          <p:cNvSpPr>
+            <a:spLocks noGrp="1"/>
+          </p:cNvSpPr>
+          <p:nvPr>
+            <p:ph idx="1"/>
+          </p:nvPr>
+        </p:nvSpPr>
+        <p:spPr/>
+        <p:txBody>
+          <a:bodyPr>
+            <a:normAutofit fontScale="92500" lnSpcReduction="20000"/>
+          </a:bodyPr>
+          <a:lstStyle/>
+          <a:p>
+            <a:r>
+              <a:rPr lang="ru-RU" dirty="0"/>
+              <a:t>Какие из следующих утверждений относятся к данной реализации</a:t>
+            </a:r>
           </a:p>
           <a:p>
             <a:pPr lvl="1">
@@ -6244,7 +6334,7 @@
 </p:sld>
 </file>
 
-<file path=ppt/slides/slide13.xml><?xml version="1.0" encoding="utf-8"?>
+<file path=ppt/slides/slide14.xml><?xml version="1.0" encoding="utf-8"?>
 <p:sld xmlns:a="http://schemas.openxmlformats.org/drawingml/2006/main" xmlns:r="http://schemas.openxmlformats.org/officeDocument/2006/relationships" xmlns:p="http://schemas.openxmlformats.org/presentationml/2006/main">
   <p:cSld>
     <p:spTree>
@@ -7580,7 +7670,7 @@
 </p:sld>
 </file>
 
-<file path=ppt/slides/slide14.xml><?xml version="1.0" encoding="utf-8"?>
+<file path=ppt/slides/slide15.xml><?xml version="1.0" encoding="utf-8"?>
 <p:sld xmlns:a="http://schemas.openxmlformats.org/drawingml/2006/main" xmlns:r="http://schemas.openxmlformats.org/officeDocument/2006/relationships" xmlns:p="http://schemas.openxmlformats.org/presentationml/2006/main">
   <p:cSld>
     <p:spTree>
@@ -7656,7 +7746,7 @@
 </p:sld>
 </file>
 
-<file path=ppt/slides/slide15.xml><?xml version="1.0" encoding="utf-8"?>
+<file path=ppt/slides/slide16.xml><?xml version="1.0" encoding="utf-8"?>
 <p:sld xmlns:a="http://schemas.openxmlformats.org/drawingml/2006/main" xmlns:r="http://schemas.openxmlformats.org/officeDocument/2006/relationships" xmlns:p="http://schemas.openxmlformats.org/presentationml/2006/main">
   <p:cSld>
     <p:spTree>
@@ -8248,7 +8338,7 @@
 </p:sld>
 </file>
 
-<file path=ppt/slides/slide16.xml><?xml version="1.0" encoding="utf-8"?>
+<file path=ppt/slides/slide17.xml><?xml version="1.0" encoding="utf-8"?>
 <p:sld xmlns:a="http://schemas.openxmlformats.org/drawingml/2006/main" xmlns:r="http://schemas.openxmlformats.org/officeDocument/2006/relationships" xmlns:p="http://schemas.openxmlformats.org/presentationml/2006/main">
   <p:cSld>
     <p:spTree>
@@ -8319,7 +8409,7 @@
 </p:sld>
 </file>
 
-<file path=ppt/slides/slide17.xml><?xml version="1.0" encoding="utf-8"?>
+<file path=ppt/slides/slide18.xml><?xml version="1.0" encoding="utf-8"?>
 <p:sld xmlns:a="http://schemas.openxmlformats.org/drawingml/2006/main" xmlns:r="http://schemas.openxmlformats.org/officeDocument/2006/relationships" xmlns:p="http://schemas.openxmlformats.org/presentationml/2006/main">
   <p:cSld>
     <p:spTree>
@@ -8430,7 +8520,7 @@
 </p:sld>
 </file>
 
-<file path=ppt/slides/slide18.xml><?xml version="1.0" encoding="utf-8"?>
+<file path=ppt/slides/slide19.xml><?xml version="1.0" encoding="utf-8"?>
 <p:sld xmlns:a="http://schemas.openxmlformats.org/drawingml/2006/main" xmlns:r="http://schemas.openxmlformats.org/officeDocument/2006/relationships" xmlns:p="http://schemas.openxmlformats.org/presentationml/2006/main">
   <p:cSld>
     <p:spTree>
@@ -8775,7 +8865,99 @@
 </p:sld>
 </file>
 
-<file path=ppt/slides/slide19.xml><?xml version="1.0" encoding="utf-8"?>
+<file path=ppt/slides/slide2.xml><?xml version="1.0" encoding="utf-8"?>
+<p:sld xmlns:a="http://schemas.openxmlformats.org/drawingml/2006/main" xmlns:r="http://schemas.openxmlformats.org/officeDocument/2006/relationships" xmlns:p="http://schemas.openxmlformats.org/presentationml/2006/main">
+  <p:cSld>
+    <p:spTree>
+      <p:nvGrpSpPr>
+        <p:cNvPr id="1" name=""/>
+        <p:cNvGrpSpPr/>
+        <p:nvPr/>
+      </p:nvGrpSpPr>
+      <p:grpSpPr>
+        <a:xfrm>
+          <a:off x="0" y="0"/>
+          <a:ext cx="0" cy="0"/>
+          <a:chOff x="0" y="0"/>
+          <a:chExt cx="0" cy="0"/>
+        </a:xfrm>
+      </p:grpSpPr>
+      <p:sp>
+        <p:nvSpPr>
+          <p:cNvPr id="2" name="Заголовок 1">
+            <a:extLst>
+              <a:ext uri="{FF2B5EF4-FFF2-40B4-BE49-F238E27FC236}">
+                <a16:creationId xmlns:a16="http://schemas.microsoft.com/office/drawing/2014/main" id="{D2CD8298-70BA-18D6-EF7E-186A292849BB}"/>
+              </a:ext>
+            </a:extLst>
+          </p:cNvPr>
+          <p:cNvSpPr>
+            <a:spLocks noGrp="1"/>
+          </p:cNvSpPr>
+          <p:nvPr>
+            <p:ph type="title"/>
+          </p:nvPr>
+        </p:nvSpPr>
+        <p:spPr/>
+        <p:txBody>
+          <a:bodyPr/>
+          <a:lstStyle/>
+          <a:p>
+            <a:r>
+              <a:rPr lang="ru-RU" dirty="0"/>
+              <a:t>Пример</a:t>
+            </a:r>
+          </a:p>
+        </p:txBody>
+      </p:sp>
+      <p:pic>
+        <p:nvPicPr>
+          <p:cNvPr id="7" name="Объект 6">
+            <a:extLst>
+              <a:ext uri="{FF2B5EF4-FFF2-40B4-BE49-F238E27FC236}">
+                <a16:creationId xmlns:a16="http://schemas.microsoft.com/office/drawing/2014/main" id="{70E2EC8F-35C8-8CB4-19A1-552E98E3A9E0}"/>
+              </a:ext>
+            </a:extLst>
+          </p:cNvPr>
+          <p:cNvPicPr>
+            <a:picLocks noGrp="1" noChangeAspect="1"/>
+          </p:cNvPicPr>
+          <p:nvPr>
+            <p:ph idx="1"/>
+          </p:nvPr>
+        </p:nvPicPr>
+        <p:blipFill>
+          <a:blip r:embed="rId2">
+            <a:extLst>
+              <a:ext uri="{28A0092B-C50C-407E-A947-70E740481C1C}">
+                <a14:useLocalDpi xmlns:a14="http://schemas.microsoft.com/office/drawing/2010/main" val="0"/>
+              </a:ext>
+            </a:extLst>
+          </a:blip>
+          <a:srcRect/>
+          <a:stretch/>
+        </p:blipFill>
+        <p:spPr>
+          <a:xfrm>
+            <a:off x="752475" y="2163762"/>
+            <a:ext cx="7639049" cy="3848100"/>
+          </a:xfrm>
+        </p:spPr>
+      </p:pic>
+    </p:spTree>
+    <p:extLst>
+      <p:ext uri="{BB962C8B-B14F-4D97-AF65-F5344CB8AC3E}">
+        <p14:creationId xmlns:p14="http://schemas.microsoft.com/office/powerpoint/2010/main" val="1373731628"/>
+      </p:ext>
+    </p:extLst>
+  </p:cSld>
+  <p:clrMapOvr>
+    <a:masterClrMapping/>
+  </p:clrMapOvr>
+</p:sld>
+</file>
+
+<file path=ppt/slides/slide20.xml><?xml version="1.0" encoding="utf-8"?>
 <p:sld xmlns:a="http://schemas.openxmlformats.org/drawingml/2006/main" xmlns:r="http://schemas.openxmlformats.org/officeDocument/2006/relationships" xmlns:p="http://schemas.openxmlformats.org/presentationml/2006/main">
   <p:cSld>
     <p:spTree>
@@ -8966,99 +9148,7 @@
 </p:sld>
 </file>
 
-<file path=ppt/slides/slide2.xml><?xml version="1.0" encoding="utf-8"?>
-<p:sld xmlns:a="http://schemas.openxmlformats.org/drawingml/2006/main" xmlns:r="http://schemas.openxmlformats.org/officeDocument/2006/relationships" xmlns:p="http://schemas.openxmlformats.org/presentationml/2006/main">
-  <p:cSld>
-    <p:spTree>
-      <p:nvGrpSpPr>
-        <p:cNvPr id="1" name=""/>
-        <p:cNvGrpSpPr/>
-        <p:nvPr/>
-      </p:nvGrpSpPr>
-      <p:grpSpPr>
-        <a:xfrm>
-          <a:off x="0" y="0"/>
-          <a:ext cx="0" cy="0"/>
-          <a:chOff x="0" y="0"/>
-          <a:chExt cx="0" cy="0"/>
-        </a:xfrm>
-      </p:grpSpPr>
-      <p:sp>
-        <p:nvSpPr>
-          <p:cNvPr id="2" name="Заголовок 1">
-            <a:extLst>
-              <a:ext uri="{FF2B5EF4-FFF2-40B4-BE49-F238E27FC236}">
-                <a16:creationId xmlns:a16="http://schemas.microsoft.com/office/drawing/2014/main" id="{D2CD8298-70BA-18D6-EF7E-186A292849BB}"/>
-              </a:ext>
-            </a:extLst>
-          </p:cNvPr>
-          <p:cNvSpPr>
-            <a:spLocks noGrp="1"/>
-          </p:cNvSpPr>
-          <p:nvPr>
-            <p:ph type="title"/>
-          </p:nvPr>
-        </p:nvSpPr>
-        <p:spPr/>
-        <p:txBody>
-          <a:bodyPr/>
-          <a:lstStyle/>
-          <a:p>
-            <a:r>
-              <a:rPr lang="ru-RU" dirty="0"/>
-              <a:t>Пример</a:t>
-            </a:r>
-          </a:p>
-        </p:txBody>
-      </p:sp>
-      <p:pic>
-        <p:nvPicPr>
-          <p:cNvPr id="7" name="Объект 6">
-            <a:extLst>
-              <a:ext uri="{FF2B5EF4-FFF2-40B4-BE49-F238E27FC236}">
-                <a16:creationId xmlns:a16="http://schemas.microsoft.com/office/drawing/2014/main" id="{70E2EC8F-35C8-8CB4-19A1-552E98E3A9E0}"/>
-              </a:ext>
-            </a:extLst>
-          </p:cNvPr>
-          <p:cNvPicPr>
-            <a:picLocks noGrp="1" noChangeAspect="1"/>
-          </p:cNvPicPr>
-          <p:nvPr>
-            <p:ph idx="1"/>
-          </p:nvPr>
-        </p:nvPicPr>
-        <p:blipFill>
-          <a:blip r:embed="rId2">
-            <a:extLst>
-              <a:ext uri="{28A0092B-C50C-407E-A947-70E740481C1C}">
-                <a14:useLocalDpi xmlns:a14="http://schemas.microsoft.com/office/drawing/2010/main" val="0"/>
-              </a:ext>
-            </a:extLst>
-          </a:blip>
-          <a:srcRect/>
-          <a:stretch/>
-        </p:blipFill>
-        <p:spPr>
-          <a:xfrm>
-            <a:off x="752475" y="2163762"/>
-            <a:ext cx="7639049" cy="3848100"/>
-          </a:xfrm>
-        </p:spPr>
-      </p:pic>
-    </p:spTree>
-    <p:extLst>
-      <p:ext uri="{BB962C8B-B14F-4D97-AF65-F5344CB8AC3E}">
-        <p14:creationId xmlns:p14="http://schemas.microsoft.com/office/powerpoint/2010/main" val="1373731628"/>
-      </p:ext>
-    </p:extLst>
-  </p:cSld>
-  <p:clrMapOvr>
-    <a:masterClrMapping/>
-  </p:clrMapOvr>
-</p:sld>
-</file>
-
-<file path=ppt/slides/slide20.xml><?xml version="1.0" encoding="utf-8"?>
+<file path=ppt/slides/slide21.xml><?xml version="1.0" encoding="utf-8"?>
 <p:sld xmlns:a="http://schemas.openxmlformats.org/drawingml/2006/main" xmlns:r="http://schemas.openxmlformats.org/officeDocument/2006/relationships" xmlns:p="http://schemas.openxmlformats.org/presentationml/2006/main">
   <p:cSld>
     <p:spTree>
@@ -9132,7 +9222,7 @@
 </p:sld>
 </file>
 
-<file path=ppt/slides/slide21.xml><?xml version="1.0" encoding="utf-8"?>
+<file path=ppt/slides/slide22.xml><?xml version="1.0" encoding="utf-8"?>
 <p:sld xmlns:a="http://schemas.openxmlformats.org/drawingml/2006/main" xmlns:r="http://schemas.openxmlformats.org/officeDocument/2006/relationships" xmlns:p="http://schemas.openxmlformats.org/presentationml/2006/main">
   <p:cSld>
     <p:spTree>
@@ -9210,7 +9300,7 @@
 </p:sld>
 </file>
 
-<file path=ppt/slides/slide22.xml><?xml version="1.0" encoding="utf-8"?>
+<file path=ppt/slides/slide23.xml><?xml version="1.0" encoding="utf-8"?>
 <p:sld xmlns:a="http://schemas.openxmlformats.org/drawingml/2006/main" xmlns:r="http://schemas.openxmlformats.org/officeDocument/2006/relationships" xmlns:p="http://schemas.openxmlformats.org/presentationml/2006/main">
   <p:cSld>
     <p:spTree>
@@ -9562,7 +9652,7 @@
 </p:sld>
 </file>
 
-<file path=ppt/slides/slide23.xml><?xml version="1.0" encoding="utf-8"?>
+<file path=ppt/slides/slide24.xml><?xml version="1.0" encoding="utf-8"?>
 <p:sld xmlns:a="http://schemas.openxmlformats.org/drawingml/2006/main" xmlns:r="http://schemas.openxmlformats.org/officeDocument/2006/relationships" xmlns:p="http://schemas.openxmlformats.org/presentationml/2006/main">
   <p:cSld>
     <p:spTree>
@@ -9626,7 +9716,7 @@
             </a:r>
             <a:r>
               <a:rPr lang="ru-RU" dirty="0"/>
-              <a:t>, если могут взаимодействовать, обладая минимумом информации друг о друге</a:t>
+              <a:t>, если могут взаимодействовать, зная минимум информации друг о друге</a:t>
             </a:r>
           </a:p>
           <a:p>
@@ -9808,7 +9898,7 @@
 </p:sld>
 </file>
 
-<file path=ppt/slides/slide24.xml><?xml version="1.0" encoding="utf-8"?>
+<file path=ppt/slides/slide25.xml><?xml version="1.0" encoding="utf-8"?>
 <p:sld xmlns:a="http://schemas.openxmlformats.org/drawingml/2006/main" xmlns:r="http://schemas.openxmlformats.org/officeDocument/2006/relationships" xmlns:p="http://schemas.openxmlformats.org/presentationml/2006/main">
   <p:cSld>
     <p:spTree>
@@ -10275,7 +10365,7 @@
 </p:sld>
 </file>
 
-<file path=ppt/slides/slide25.xml><?xml version="1.0" encoding="utf-8"?>
+<file path=ppt/slides/slide26.xml><?xml version="1.0" encoding="utf-8"?>
 <p:sld xmlns:a="http://schemas.openxmlformats.org/drawingml/2006/main" xmlns:r="http://schemas.openxmlformats.org/officeDocument/2006/relationships" xmlns:p="http://schemas.openxmlformats.org/presentationml/2006/main">
   <p:cSld>
     <p:spTree>
@@ -10560,7 +10650,7 @@
 </p:sld>
 </file>
 
-<file path=ppt/slides/slide26.xml><?xml version="1.0" encoding="utf-8"?>
+<file path=ppt/slides/slide27.xml><?xml version="1.0" encoding="utf-8"?>
 <p:sld xmlns:a="http://schemas.openxmlformats.org/drawingml/2006/main" xmlns:r="http://schemas.openxmlformats.org/officeDocument/2006/relationships" xmlns:p="http://schemas.openxmlformats.org/presentationml/2006/main">
   <p:cSld>
     <p:spTree>
@@ -10795,7 +10885,109 @@
 </p:sld>
 </file>
 
-<file path=ppt/slides/slide27.xml><?xml version="1.0" encoding="utf-8"?>
+<file path=ppt/slides/slide28.xml><?xml version="1.0" encoding="utf-8"?>
+<p:sld xmlns:a="http://schemas.openxmlformats.org/drawingml/2006/main" xmlns:r="http://schemas.openxmlformats.org/officeDocument/2006/relationships" xmlns:p="http://schemas.openxmlformats.org/presentationml/2006/main">
+  <p:cSld>
+    <p:spTree>
+      <p:nvGrpSpPr>
+        <p:cNvPr id="1" name=""/>
+        <p:cNvGrpSpPr/>
+        <p:nvPr/>
+      </p:nvGrpSpPr>
+      <p:grpSpPr>
+        <a:xfrm>
+          <a:off x="0" y="0"/>
+          <a:ext cx="0" cy="0"/>
+          <a:chOff x="0" y="0"/>
+          <a:chExt cx="0" cy="0"/>
+        </a:xfrm>
+      </p:grpSpPr>
+      <p:sp>
+        <p:nvSpPr>
+          <p:cNvPr id="3" name="Заголовок 2">
+            <a:extLst>
+              <a:ext uri="{FF2B5EF4-FFF2-40B4-BE49-F238E27FC236}">
+                <a16:creationId xmlns:a16="http://schemas.microsoft.com/office/drawing/2014/main" id="{2C63959F-5E1B-4AD2-DAB0-AA833F725ADB}"/>
+              </a:ext>
+            </a:extLst>
+          </p:cNvPr>
+          <p:cNvSpPr>
+            <a:spLocks noGrp="1"/>
+          </p:cNvSpPr>
+          <p:nvPr>
+            <p:ph type="title"/>
+          </p:nvPr>
+        </p:nvSpPr>
+        <p:spPr/>
+        <p:txBody>
+          <a:bodyPr/>
+          <a:lstStyle/>
+          <a:p>
+            <a:r>
+              <a:rPr lang="en-US" dirty="0"/>
+              <a:t>Observer </a:t>
+            </a:r>
+            <a:r>
+              <a:rPr lang="ru-RU" dirty="0"/>
+              <a:t>и </a:t>
+            </a:r>
+            <a:r>
+              <a:rPr lang="en-US" dirty="0" err="1"/>
+              <a:t>WeatherData</a:t>
+            </a:r>
+            <a:endParaRPr lang="ru-RU" dirty="0"/>
+          </a:p>
+        </p:txBody>
+      </p:sp>
+      <p:pic>
+        <p:nvPicPr>
+          <p:cNvPr id="6" name="Объект 5">
+            <a:extLst>
+              <a:ext uri="{FF2B5EF4-FFF2-40B4-BE49-F238E27FC236}">
+                <a16:creationId xmlns:a16="http://schemas.microsoft.com/office/drawing/2014/main" id="{698313A8-3AE0-54EF-3646-45F1A189E95F}"/>
+              </a:ext>
+            </a:extLst>
+          </p:cNvPr>
+          <p:cNvPicPr>
+            <a:picLocks noGrp="1" noChangeAspect="1"/>
+          </p:cNvPicPr>
+          <p:nvPr>
+            <p:ph idx="1"/>
+          </p:nvPr>
+        </p:nvPicPr>
+        <p:blipFill>
+          <a:blip r:embed="rId2">
+            <a:extLst>
+              <a:ext uri="{28A0092B-C50C-407E-A947-70E740481C1C}">
+                <a14:useLocalDpi xmlns:a14="http://schemas.microsoft.com/office/drawing/2010/main" val="0"/>
+              </a:ext>
+            </a:extLst>
+          </a:blip>
+          <a:stretch>
+            <a:fillRect/>
+          </a:stretch>
+        </p:blipFill>
+        <p:spPr>
+          <a:xfrm>
+            <a:off x="457200" y="2636912"/>
+            <a:ext cx="8226117" cy="3449662"/>
+          </a:xfrm>
+        </p:spPr>
+      </p:pic>
+    </p:spTree>
+    <p:extLst>
+      <p:ext uri="{BB962C8B-B14F-4D97-AF65-F5344CB8AC3E}">
+        <p14:creationId xmlns:p14="http://schemas.microsoft.com/office/powerpoint/2010/main" val="60585863"/>
+      </p:ext>
+    </p:extLst>
+  </p:cSld>
+  <p:clrMapOvr>
+    <a:masterClrMapping/>
+  </p:clrMapOvr>
+</p:sld>
+</file>
+
+<file path=ppt/slides/slide29.xml><?xml version="1.0" encoding="utf-8"?>
 <p:sld xmlns:a="http://schemas.openxmlformats.org/drawingml/2006/main" xmlns:r="http://schemas.openxmlformats.org/officeDocument/2006/relationships" xmlns:p="http://schemas.openxmlformats.org/presentationml/2006/main">
   <p:cSld>
     <p:spTree>
@@ -11192,494 +11384,6 @@
 </p:sld>
 </file>
 
-<file path=ppt/slides/slide28.xml><?xml version="1.0" encoding="utf-8"?>
-<p:sld xmlns:a="http://schemas.openxmlformats.org/drawingml/2006/main" xmlns:r="http://schemas.openxmlformats.org/officeDocument/2006/relationships" xmlns:p="http://schemas.openxmlformats.org/presentationml/2006/main">
-  <p:cSld>
-    <p:spTree>
-      <p:nvGrpSpPr>
-        <p:cNvPr id="1" name=""/>
-        <p:cNvGrpSpPr/>
-        <p:nvPr/>
-      </p:nvGrpSpPr>
-      <p:grpSpPr>
-        <a:xfrm>
-          <a:off x="0" y="0"/>
-          <a:ext cx="0" cy="0"/>
-          <a:chOff x="0" y="0"/>
-          <a:chExt cx="0" cy="0"/>
-        </a:xfrm>
-      </p:grpSpPr>
-      <p:sp>
-        <p:nvSpPr>
-          <p:cNvPr id="2" name="Title 1"/>
-          <p:cNvSpPr>
-            <a:spLocks noGrp="1"/>
-          </p:cNvSpPr>
-          <p:nvPr>
-            <p:ph type="title"/>
-          </p:nvPr>
-        </p:nvSpPr>
-        <p:spPr/>
-        <p:txBody>
-          <a:bodyPr>
-            <a:normAutofit fontScale="90000"/>
-          </a:bodyPr>
-          <a:lstStyle/>
-          <a:p>
-            <a:r>
-              <a:rPr lang="ru-RU" dirty="0"/>
-              <a:t>Модель вытягивания</a:t>
-            </a:r>
-            <a:r>
-              <a:rPr lang="en-US" dirty="0"/>
-              <a:t> (pull model)</a:t>
-            </a:r>
-            <a:endParaRPr lang="ru-RU" dirty="0"/>
-          </a:p>
-        </p:txBody>
-      </p:sp>
-      <p:sp>
-        <p:nvSpPr>
-          <p:cNvPr id="3" name="Content Placeholder 2"/>
-          <p:cNvSpPr>
-            <a:spLocks noGrp="1"/>
-          </p:cNvSpPr>
-          <p:nvPr>
-            <p:ph idx="1"/>
-          </p:nvPr>
-        </p:nvSpPr>
-        <p:spPr/>
-        <p:txBody>
-          <a:bodyPr/>
-          <a:lstStyle/>
-          <a:p>
-            <a:r>
-              <a:rPr lang="ru-RU" dirty="0"/>
-              <a:t>Субъект посылает минимум информации об изменении, наблюдатели запрашивают интересующие детали</a:t>
-            </a:r>
-          </a:p>
-          <a:p>
-            <a:r>
-              <a:rPr lang="ru-RU" dirty="0"/>
-              <a:t>Достоинства</a:t>
-            </a:r>
-          </a:p>
-          <a:p>
-            <a:pPr lvl="1"/>
-            <a:r>
-              <a:rPr lang="ru-RU" dirty="0"/>
-              <a:t>Не изменяется интерфейс наблюдателя при изменении состояния субъекта</a:t>
-            </a:r>
-          </a:p>
-          <a:p>
-            <a:r>
-              <a:rPr lang="ru-RU" dirty="0"/>
-              <a:t>Недостатки</a:t>
-            </a:r>
-          </a:p>
-          <a:p>
-            <a:pPr lvl="1"/>
-            <a:r>
-              <a:rPr lang="ru-RU" dirty="0"/>
-              <a:t>Наблюдателям приходится выяснять без помощи субъекта, что именно изменилось</a:t>
-            </a:r>
-          </a:p>
-        </p:txBody>
-      </p:sp>
-    </p:spTree>
-    <p:extLst>
-      <p:ext uri="{BB962C8B-B14F-4D97-AF65-F5344CB8AC3E}">
-        <p14:creationId xmlns:p14="http://schemas.microsoft.com/office/powerpoint/2010/main" val="3917671406"/>
-      </p:ext>
-    </p:extLst>
-  </p:cSld>
-  <p:clrMapOvr>
-    <a:masterClrMapping/>
-  </p:clrMapOvr>
-  <p:timing>
-    <p:tnLst>
-      <p:par>
-        <p:cTn id="1" dur="indefinite" restart="never" nodeType="tmRoot">
-          <p:childTnLst>
-            <p:seq concurrent="1" nextAc="seek">
-              <p:cTn id="2" dur="indefinite" nodeType="mainSeq">
-                <p:childTnLst>
-                  <p:par>
-                    <p:cTn id="3" fill="hold">
-                      <p:stCondLst>
-                        <p:cond delay="indefinite"/>
-                      </p:stCondLst>
-                      <p:childTnLst>
-                        <p:par>
-                          <p:cTn id="4" fill="hold">
-                            <p:stCondLst>
-                              <p:cond delay="0"/>
-                            </p:stCondLst>
-                            <p:childTnLst>
-                              <p:par>
-                                <p:cTn id="5" presetID="10" presetClass="entr" presetSubtype="0" fill="hold" grpId="0" nodeType="clickEffect">
-                                  <p:stCondLst>
-                                    <p:cond delay="0"/>
-                                  </p:stCondLst>
-                                  <p:childTnLst>
-                                    <p:set>
-                                      <p:cBhvr>
-                                        <p:cTn id="6" dur="1" fill="hold">
-                                          <p:stCondLst>
-                                            <p:cond delay="0"/>
-                                          </p:stCondLst>
-                                        </p:cTn>
-                                        <p:tgtEl>
-                                          <p:spTgt spid="3">
-                                            <p:txEl>
-                                              <p:pRg st="0" end="0"/>
-                                            </p:txEl>
-                                          </p:spTgt>
-                                        </p:tgtEl>
-                                        <p:attrNameLst>
-                                          <p:attrName>style.visibility</p:attrName>
-                                        </p:attrNameLst>
-                                      </p:cBhvr>
-                                      <p:to>
-                                        <p:strVal val="visible"/>
-                                      </p:to>
-                                    </p:set>
-                                    <p:animEffect transition="in" filter="fade">
-                                      <p:cBhvr>
-                                        <p:cTn id="7" dur="500"/>
-                                        <p:tgtEl>
-                                          <p:spTgt spid="3">
-                                            <p:txEl>
-                                              <p:pRg st="0" end="0"/>
-                                            </p:txEl>
-                                          </p:spTgt>
-                                        </p:tgtEl>
-                                      </p:cBhvr>
-                                    </p:animEffect>
-                                  </p:childTnLst>
-                                </p:cTn>
-                              </p:par>
-                            </p:childTnLst>
-                          </p:cTn>
-                        </p:par>
-                      </p:childTnLst>
-                    </p:cTn>
-                  </p:par>
-                  <p:par>
-                    <p:cTn id="8" fill="hold">
-                      <p:stCondLst>
-                        <p:cond delay="indefinite"/>
-                      </p:stCondLst>
-                      <p:childTnLst>
-                        <p:par>
-                          <p:cTn id="9" fill="hold">
-                            <p:stCondLst>
-                              <p:cond delay="0"/>
-                            </p:stCondLst>
-                            <p:childTnLst>
-                              <p:par>
-                                <p:cTn id="10" presetID="10" presetClass="entr" presetSubtype="0" fill="hold" grpId="0" nodeType="clickEffect">
-                                  <p:stCondLst>
-                                    <p:cond delay="0"/>
-                                  </p:stCondLst>
-                                  <p:childTnLst>
-                                    <p:set>
-                                      <p:cBhvr>
-                                        <p:cTn id="11" dur="1" fill="hold">
-                                          <p:stCondLst>
-                                            <p:cond delay="0"/>
-                                          </p:stCondLst>
-                                        </p:cTn>
-                                        <p:tgtEl>
-                                          <p:spTgt spid="3">
-                                            <p:txEl>
-                                              <p:pRg st="1" end="1"/>
-                                            </p:txEl>
-                                          </p:spTgt>
-                                        </p:tgtEl>
-                                        <p:attrNameLst>
-                                          <p:attrName>style.visibility</p:attrName>
-                                        </p:attrNameLst>
-                                      </p:cBhvr>
-                                      <p:to>
-                                        <p:strVal val="visible"/>
-                                      </p:to>
-                                    </p:set>
-                                    <p:animEffect transition="in" filter="fade">
-                                      <p:cBhvr>
-                                        <p:cTn id="12" dur="500"/>
-                                        <p:tgtEl>
-                                          <p:spTgt spid="3">
-                                            <p:txEl>
-                                              <p:pRg st="1" end="1"/>
-                                            </p:txEl>
-                                          </p:spTgt>
-                                        </p:tgtEl>
-                                      </p:cBhvr>
-                                    </p:animEffect>
-                                  </p:childTnLst>
-                                </p:cTn>
-                              </p:par>
-                              <p:par>
-                                <p:cTn id="13" presetID="10" presetClass="entr" presetSubtype="0" fill="hold" grpId="0" nodeType="withEffect">
-                                  <p:stCondLst>
-                                    <p:cond delay="0"/>
-                                  </p:stCondLst>
-                                  <p:childTnLst>
-                                    <p:set>
-                                      <p:cBhvr>
-                                        <p:cTn id="14" dur="1" fill="hold">
-                                          <p:stCondLst>
-                                            <p:cond delay="0"/>
-                                          </p:stCondLst>
-                                        </p:cTn>
-                                        <p:tgtEl>
-                                          <p:spTgt spid="3">
-                                            <p:txEl>
-                                              <p:pRg st="2" end="2"/>
-                                            </p:txEl>
-                                          </p:spTgt>
-                                        </p:tgtEl>
-                                        <p:attrNameLst>
-                                          <p:attrName>style.visibility</p:attrName>
-                                        </p:attrNameLst>
-                                      </p:cBhvr>
-                                      <p:to>
-                                        <p:strVal val="visible"/>
-                                      </p:to>
-                                    </p:set>
-                                    <p:animEffect transition="in" filter="fade">
-                                      <p:cBhvr>
-                                        <p:cTn id="15" dur="500"/>
-                                        <p:tgtEl>
-                                          <p:spTgt spid="3">
-                                            <p:txEl>
-                                              <p:pRg st="2" end="2"/>
-                                            </p:txEl>
-                                          </p:spTgt>
-                                        </p:tgtEl>
-                                      </p:cBhvr>
-                                    </p:animEffect>
-                                  </p:childTnLst>
-                                </p:cTn>
-                              </p:par>
-                            </p:childTnLst>
-                          </p:cTn>
-                        </p:par>
-                      </p:childTnLst>
-                    </p:cTn>
-                  </p:par>
-                  <p:par>
-                    <p:cTn id="16" fill="hold">
-                      <p:stCondLst>
-                        <p:cond delay="indefinite"/>
-                      </p:stCondLst>
-                      <p:childTnLst>
-                        <p:par>
-                          <p:cTn id="17" fill="hold">
-                            <p:stCondLst>
-                              <p:cond delay="0"/>
-                            </p:stCondLst>
-                            <p:childTnLst>
-                              <p:par>
-                                <p:cTn id="18" presetID="10" presetClass="entr" presetSubtype="0" fill="hold" grpId="0" nodeType="clickEffect">
-                                  <p:stCondLst>
-                                    <p:cond delay="0"/>
-                                  </p:stCondLst>
-                                  <p:childTnLst>
-                                    <p:set>
-                                      <p:cBhvr>
-                                        <p:cTn id="19" dur="1" fill="hold">
-                                          <p:stCondLst>
-                                            <p:cond delay="0"/>
-                                          </p:stCondLst>
-                                        </p:cTn>
-                                        <p:tgtEl>
-                                          <p:spTgt spid="3">
-                                            <p:txEl>
-                                              <p:pRg st="3" end="3"/>
-                                            </p:txEl>
-                                          </p:spTgt>
-                                        </p:tgtEl>
-                                        <p:attrNameLst>
-                                          <p:attrName>style.visibility</p:attrName>
-                                        </p:attrNameLst>
-                                      </p:cBhvr>
-                                      <p:to>
-                                        <p:strVal val="visible"/>
-                                      </p:to>
-                                    </p:set>
-                                    <p:animEffect transition="in" filter="fade">
-                                      <p:cBhvr>
-                                        <p:cTn id="20" dur="500"/>
-                                        <p:tgtEl>
-                                          <p:spTgt spid="3">
-                                            <p:txEl>
-                                              <p:pRg st="3" end="3"/>
-                                            </p:txEl>
-                                          </p:spTgt>
-                                        </p:tgtEl>
-                                      </p:cBhvr>
-                                    </p:animEffect>
-                                  </p:childTnLst>
-                                </p:cTn>
-                              </p:par>
-                              <p:par>
-                                <p:cTn id="21" presetID="10" presetClass="entr" presetSubtype="0" fill="hold" grpId="0" nodeType="withEffect">
-                                  <p:stCondLst>
-                                    <p:cond delay="0"/>
-                                  </p:stCondLst>
-                                  <p:childTnLst>
-                                    <p:set>
-                                      <p:cBhvr>
-                                        <p:cTn id="22" dur="1" fill="hold">
-                                          <p:stCondLst>
-                                            <p:cond delay="0"/>
-                                          </p:stCondLst>
-                                        </p:cTn>
-                                        <p:tgtEl>
-                                          <p:spTgt spid="3">
-                                            <p:txEl>
-                                              <p:pRg st="4" end="4"/>
-                                            </p:txEl>
-                                          </p:spTgt>
-                                        </p:tgtEl>
-                                        <p:attrNameLst>
-                                          <p:attrName>style.visibility</p:attrName>
-                                        </p:attrNameLst>
-                                      </p:cBhvr>
-                                      <p:to>
-                                        <p:strVal val="visible"/>
-                                      </p:to>
-                                    </p:set>
-                                    <p:animEffect transition="in" filter="fade">
-                                      <p:cBhvr>
-                                        <p:cTn id="23" dur="500"/>
-                                        <p:tgtEl>
-                                          <p:spTgt spid="3">
-                                            <p:txEl>
-                                              <p:pRg st="4" end="4"/>
-                                            </p:txEl>
-                                          </p:spTgt>
-                                        </p:tgtEl>
-                                      </p:cBhvr>
-                                    </p:animEffect>
-                                  </p:childTnLst>
-                                </p:cTn>
-                              </p:par>
-                            </p:childTnLst>
-                          </p:cTn>
-                        </p:par>
-                      </p:childTnLst>
-                    </p:cTn>
-                  </p:par>
-                </p:childTnLst>
-              </p:cTn>
-              <p:prevCondLst>
-                <p:cond evt="onPrev" delay="0">
-                  <p:tgtEl>
-                    <p:sldTgt/>
-                  </p:tgtEl>
-                </p:cond>
-              </p:prevCondLst>
-              <p:nextCondLst>
-                <p:cond evt="onNext" delay="0">
-                  <p:tgtEl>
-                    <p:sldTgt/>
-                  </p:tgtEl>
-                </p:cond>
-              </p:nextCondLst>
-            </p:seq>
-          </p:childTnLst>
-        </p:cTn>
-      </p:par>
-    </p:tnLst>
-    <p:bldLst>
-      <p:bldP spid="3" grpId="0" build="p"/>
-    </p:bldLst>
-  </p:timing>
-</p:sld>
-</file>
-
-<file path=ppt/slides/slide29.xml><?xml version="1.0" encoding="utf-8"?>
-<p:sld xmlns:a="http://schemas.openxmlformats.org/drawingml/2006/main" xmlns:r="http://schemas.openxmlformats.org/officeDocument/2006/relationships" xmlns:p="http://schemas.openxmlformats.org/presentationml/2006/main">
-  <p:cSld>
-    <p:spTree>
-      <p:nvGrpSpPr>
-        <p:cNvPr id="1" name=""/>
-        <p:cNvGrpSpPr/>
-        <p:nvPr/>
-      </p:nvGrpSpPr>
-      <p:grpSpPr>
-        <a:xfrm>
-          <a:off x="0" y="0"/>
-          <a:ext cx="0" cy="0"/>
-          <a:chOff x="0" y="0"/>
-          <a:chExt cx="0" cy="0"/>
-        </a:xfrm>
-      </p:grpSpPr>
-      <p:sp>
-        <p:nvSpPr>
-          <p:cNvPr id="2" name="Title 1"/>
-          <p:cNvSpPr>
-            <a:spLocks noGrp="1"/>
-          </p:cNvSpPr>
-          <p:nvPr>
-            <p:ph type="title"/>
-          </p:nvPr>
-        </p:nvSpPr>
-        <p:spPr/>
-        <p:txBody>
-          <a:bodyPr/>
-          <a:lstStyle/>
-          <a:p>
-            <a:r>
-              <a:rPr lang="en-US" dirty="0"/>
-              <a:t>Pull Model</a:t>
-            </a:r>
-            <a:endParaRPr lang="ru-RU" dirty="0"/>
-          </a:p>
-        </p:txBody>
-      </p:sp>
-      <p:pic>
-        <p:nvPicPr>
-          <p:cNvPr id="7" name="Content Placeholder 6"/>
-          <p:cNvPicPr>
-            <a:picLocks noGrp="1" noChangeAspect="1"/>
-          </p:cNvPicPr>
-          <p:nvPr>
-            <p:ph idx="1"/>
-          </p:nvPr>
-        </p:nvPicPr>
-        <p:blipFill>
-          <a:blip r:embed="rId2"/>
-          <a:stretch>
-            <a:fillRect/>
-          </a:stretch>
-        </p:blipFill>
-        <p:spPr>
-          <a:xfrm>
-            <a:off x="371420" y="1556793"/>
-            <a:ext cx="8485015" cy="5112568"/>
-          </a:xfrm>
-          <a:prstGeom prst="rect">
-            <a:avLst/>
-          </a:prstGeom>
-        </p:spPr>
-      </p:pic>
-    </p:spTree>
-    <p:extLst>
-      <p:ext uri="{BB962C8B-B14F-4D97-AF65-F5344CB8AC3E}">
-        <p14:creationId xmlns:p14="http://schemas.microsoft.com/office/powerpoint/2010/main" val="3475233543"/>
-      </p:ext>
-    </p:extLst>
-  </p:cSld>
-  <p:clrMapOvr>
-    <a:masterClrMapping/>
-  </p:clrMapOvr>
-</p:sld>
-</file>
-
 <file path=ppt/slides/slide3.xml><?xml version="1.0" encoding="utf-8"?>
 <p:sld xmlns:a="http://schemas.openxmlformats.org/drawingml/2006/main" xmlns:r="http://schemas.openxmlformats.org/officeDocument/2006/relationships" xmlns:p="http://schemas.openxmlformats.org/presentationml/2006/main">
   <p:cSld>
@@ -11722,7 +11426,7 @@
           <a:p>
             <a:r>
               <a:rPr lang="ru-RU" dirty="0"/>
-              <a:t>Человек управляет светом самостоятельно</a:t>
+              <a:t>Человек управляет приборами самостоятельно</a:t>
             </a:r>
           </a:p>
         </p:txBody>
@@ -11810,11 +11514,11 @@
           <a:p>
             <a:r>
               <a:rPr lang="ru-RU" dirty="0"/>
-              <a:t>Модель проталкивания </a:t>
+              <a:t>Модель вытягивания</a:t>
             </a:r>
             <a:r>
               <a:rPr lang="en-US" dirty="0"/>
-              <a:t>(push model)</a:t>
+              <a:t> (pull model)</a:t>
             </a:r>
             <a:endParaRPr lang="ru-RU" dirty="0"/>
           </a:p>
@@ -11837,7 +11541,7 @@
           <a:p>
             <a:r>
               <a:rPr lang="ru-RU" dirty="0"/>
-              <a:t>Субъект посылает детальную информацию об изменении, независимо от того, нужно ли это наблюдателям</a:t>
+              <a:t>Субъект посылает минимум информации об изменении, наблюдатели запрашивают интересующие детали</a:t>
             </a:r>
           </a:p>
           <a:p>
@@ -11850,7 +11554,7 @@
             <a:pPr lvl="1"/>
             <a:r>
               <a:rPr lang="ru-RU" dirty="0"/>
-              <a:t>Наблюдателям легче понять, что именно изменилось</a:t>
+              <a:t>Не изменяется интерфейс наблюдателя при изменении состояния субъекта</a:t>
             </a:r>
           </a:p>
           <a:p>
@@ -11863,7 +11567,7 @@
             <a:pPr lvl="1"/>
             <a:r>
               <a:rPr lang="ru-RU" dirty="0"/>
-              <a:t>Снижение повторного использования кода</a:t>
+              <a:t>Наблюдателям приходится выяснять без помощи субъекта, что именно изменилось</a:t>
             </a:r>
           </a:p>
         </p:txBody>
@@ -11871,7 +11575,7 @@
     </p:spTree>
     <p:extLst>
       <p:ext uri="{BB962C8B-B14F-4D97-AF65-F5344CB8AC3E}">
-        <p14:creationId xmlns:p14="http://schemas.microsoft.com/office/powerpoint/2010/main" val="1832402990"/>
+        <p14:creationId xmlns:p14="http://schemas.microsoft.com/office/powerpoint/2010/main" val="3917671406"/>
       </p:ext>
     </p:extLst>
   </p:cSld>
@@ -12217,6 +11921,494 @@
           <a:p>
             <a:r>
               <a:rPr lang="en-US" dirty="0"/>
+              <a:t>Pull Model</a:t>
+            </a:r>
+            <a:endParaRPr lang="ru-RU" dirty="0"/>
+          </a:p>
+        </p:txBody>
+      </p:sp>
+      <p:pic>
+        <p:nvPicPr>
+          <p:cNvPr id="7" name="Content Placeholder 6"/>
+          <p:cNvPicPr>
+            <a:picLocks noGrp="1" noChangeAspect="1"/>
+          </p:cNvPicPr>
+          <p:nvPr>
+            <p:ph idx="1"/>
+          </p:nvPr>
+        </p:nvPicPr>
+        <p:blipFill>
+          <a:blip r:embed="rId2"/>
+          <a:stretch>
+            <a:fillRect/>
+          </a:stretch>
+        </p:blipFill>
+        <p:spPr>
+          <a:xfrm>
+            <a:off x="371420" y="1556793"/>
+            <a:ext cx="8485015" cy="5112568"/>
+          </a:xfrm>
+          <a:prstGeom prst="rect">
+            <a:avLst/>
+          </a:prstGeom>
+        </p:spPr>
+      </p:pic>
+    </p:spTree>
+    <p:extLst>
+      <p:ext uri="{BB962C8B-B14F-4D97-AF65-F5344CB8AC3E}">
+        <p14:creationId xmlns:p14="http://schemas.microsoft.com/office/powerpoint/2010/main" val="3475233543"/>
+      </p:ext>
+    </p:extLst>
+  </p:cSld>
+  <p:clrMapOvr>
+    <a:masterClrMapping/>
+  </p:clrMapOvr>
+</p:sld>
+</file>
+
+<file path=ppt/slides/slide32.xml><?xml version="1.0" encoding="utf-8"?>
+<p:sld xmlns:a="http://schemas.openxmlformats.org/drawingml/2006/main" xmlns:r="http://schemas.openxmlformats.org/officeDocument/2006/relationships" xmlns:p="http://schemas.openxmlformats.org/presentationml/2006/main">
+  <p:cSld>
+    <p:spTree>
+      <p:nvGrpSpPr>
+        <p:cNvPr id="1" name=""/>
+        <p:cNvGrpSpPr/>
+        <p:nvPr/>
+      </p:nvGrpSpPr>
+      <p:grpSpPr>
+        <a:xfrm>
+          <a:off x="0" y="0"/>
+          <a:ext cx="0" cy="0"/>
+          <a:chOff x="0" y="0"/>
+          <a:chExt cx="0" cy="0"/>
+        </a:xfrm>
+      </p:grpSpPr>
+      <p:sp>
+        <p:nvSpPr>
+          <p:cNvPr id="2" name="Title 1"/>
+          <p:cNvSpPr>
+            <a:spLocks noGrp="1"/>
+          </p:cNvSpPr>
+          <p:nvPr>
+            <p:ph type="title"/>
+          </p:nvPr>
+        </p:nvSpPr>
+        <p:spPr/>
+        <p:txBody>
+          <a:bodyPr>
+            <a:normAutofit fontScale="90000"/>
+          </a:bodyPr>
+          <a:lstStyle/>
+          <a:p>
+            <a:r>
+              <a:rPr lang="ru-RU" dirty="0"/>
+              <a:t>Модель проталкивания </a:t>
+            </a:r>
+            <a:r>
+              <a:rPr lang="en-US" dirty="0"/>
+              <a:t>(push model)</a:t>
+            </a:r>
+            <a:endParaRPr lang="ru-RU" dirty="0"/>
+          </a:p>
+        </p:txBody>
+      </p:sp>
+      <p:sp>
+        <p:nvSpPr>
+          <p:cNvPr id="3" name="Content Placeholder 2"/>
+          <p:cNvSpPr>
+            <a:spLocks noGrp="1"/>
+          </p:cNvSpPr>
+          <p:nvPr>
+            <p:ph idx="1"/>
+          </p:nvPr>
+        </p:nvSpPr>
+        <p:spPr/>
+        <p:txBody>
+          <a:bodyPr/>
+          <a:lstStyle/>
+          <a:p>
+            <a:r>
+              <a:rPr lang="ru-RU" dirty="0"/>
+              <a:t>Субъект посылает детальную информацию об изменении, независимо от того, нужно ли это наблюдателям</a:t>
+            </a:r>
+          </a:p>
+          <a:p>
+            <a:r>
+              <a:rPr lang="ru-RU" dirty="0"/>
+              <a:t>Достоинства</a:t>
+            </a:r>
+          </a:p>
+          <a:p>
+            <a:pPr lvl="1"/>
+            <a:r>
+              <a:rPr lang="ru-RU" dirty="0"/>
+              <a:t>Наблюдателям легче понять, что именно изменилось</a:t>
+            </a:r>
+          </a:p>
+          <a:p>
+            <a:r>
+              <a:rPr lang="ru-RU" dirty="0"/>
+              <a:t>Недостатки</a:t>
+            </a:r>
+          </a:p>
+          <a:p>
+            <a:pPr lvl="1"/>
+            <a:r>
+              <a:rPr lang="ru-RU" dirty="0"/>
+              <a:t>Снижение повторного использования кода</a:t>
+            </a:r>
+          </a:p>
+        </p:txBody>
+      </p:sp>
+    </p:spTree>
+    <p:extLst>
+      <p:ext uri="{BB962C8B-B14F-4D97-AF65-F5344CB8AC3E}">
+        <p14:creationId xmlns:p14="http://schemas.microsoft.com/office/powerpoint/2010/main" val="1832402990"/>
+      </p:ext>
+    </p:extLst>
+  </p:cSld>
+  <p:clrMapOvr>
+    <a:masterClrMapping/>
+  </p:clrMapOvr>
+  <p:timing>
+    <p:tnLst>
+      <p:par>
+        <p:cTn id="1" dur="indefinite" restart="never" nodeType="tmRoot">
+          <p:childTnLst>
+            <p:seq concurrent="1" nextAc="seek">
+              <p:cTn id="2" dur="indefinite" nodeType="mainSeq">
+                <p:childTnLst>
+                  <p:par>
+                    <p:cTn id="3" fill="hold">
+                      <p:stCondLst>
+                        <p:cond delay="indefinite"/>
+                      </p:stCondLst>
+                      <p:childTnLst>
+                        <p:par>
+                          <p:cTn id="4" fill="hold">
+                            <p:stCondLst>
+                              <p:cond delay="0"/>
+                            </p:stCondLst>
+                            <p:childTnLst>
+                              <p:par>
+                                <p:cTn id="5" presetID="10" presetClass="entr" presetSubtype="0" fill="hold" grpId="0" nodeType="clickEffect">
+                                  <p:stCondLst>
+                                    <p:cond delay="0"/>
+                                  </p:stCondLst>
+                                  <p:childTnLst>
+                                    <p:set>
+                                      <p:cBhvr>
+                                        <p:cTn id="6" dur="1" fill="hold">
+                                          <p:stCondLst>
+                                            <p:cond delay="0"/>
+                                          </p:stCondLst>
+                                        </p:cTn>
+                                        <p:tgtEl>
+                                          <p:spTgt spid="3">
+                                            <p:txEl>
+                                              <p:pRg st="0" end="0"/>
+                                            </p:txEl>
+                                          </p:spTgt>
+                                        </p:tgtEl>
+                                        <p:attrNameLst>
+                                          <p:attrName>style.visibility</p:attrName>
+                                        </p:attrNameLst>
+                                      </p:cBhvr>
+                                      <p:to>
+                                        <p:strVal val="visible"/>
+                                      </p:to>
+                                    </p:set>
+                                    <p:animEffect transition="in" filter="fade">
+                                      <p:cBhvr>
+                                        <p:cTn id="7" dur="500"/>
+                                        <p:tgtEl>
+                                          <p:spTgt spid="3">
+                                            <p:txEl>
+                                              <p:pRg st="0" end="0"/>
+                                            </p:txEl>
+                                          </p:spTgt>
+                                        </p:tgtEl>
+                                      </p:cBhvr>
+                                    </p:animEffect>
+                                  </p:childTnLst>
+                                </p:cTn>
+                              </p:par>
+                            </p:childTnLst>
+                          </p:cTn>
+                        </p:par>
+                      </p:childTnLst>
+                    </p:cTn>
+                  </p:par>
+                  <p:par>
+                    <p:cTn id="8" fill="hold">
+                      <p:stCondLst>
+                        <p:cond delay="indefinite"/>
+                      </p:stCondLst>
+                      <p:childTnLst>
+                        <p:par>
+                          <p:cTn id="9" fill="hold">
+                            <p:stCondLst>
+                              <p:cond delay="0"/>
+                            </p:stCondLst>
+                            <p:childTnLst>
+                              <p:par>
+                                <p:cTn id="10" presetID="10" presetClass="entr" presetSubtype="0" fill="hold" grpId="0" nodeType="clickEffect">
+                                  <p:stCondLst>
+                                    <p:cond delay="0"/>
+                                  </p:stCondLst>
+                                  <p:childTnLst>
+                                    <p:set>
+                                      <p:cBhvr>
+                                        <p:cTn id="11" dur="1" fill="hold">
+                                          <p:stCondLst>
+                                            <p:cond delay="0"/>
+                                          </p:stCondLst>
+                                        </p:cTn>
+                                        <p:tgtEl>
+                                          <p:spTgt spid="3">
+                                            <p:txEl>
+                                              <p:pRg st="1" end="1"/>
+                                            </p:txEl>
+                                          </p:spTgt>
+                                        </p:tgtEl>
+                                        <p:attrNameLst>
+                                          <p:attrName>style.visibility</p:attrName>
+                                        </p:attrNameLst>
+                                      </p:cBhvr>
+                                      <p:to>
+                                        <p:strVal val="visible"/>
+                                      </p:to>
+                                    </p:set>
+                                    <p:animEffect transition="in" filter="fade">
+                                      <p:cBhvr>
+                                        <p:cTn id="12" dur="500"/>
+                                        <p:tgtEl>
+                                          <p:spTgt spid="3">
+                                            <p:txEl>
+                                              <p:pRg st="1" end="1"/>
+                                            </p:txEl>
+                                          </p:spTgt>
+                                        </p:tgtEl>
+                                      </p:cBhvr>
+                                    </p:animEffect>
+                                  </p:childTnLst>
+                                </p:cTn>
+                              </p:par>
+                              <p:par>
+                                <p:cTn id="13" presetID="10" presetClass="entr" presetSubtype="0" fill="hold" grpId="0" nodeType="withEffect">
+                                  <p:stCondLst>
+                                    <p:cond delay="0"/>
+                                  </p:stCondLst>
+                                  <p:childTnLst>
+                                    <p:set>
+                                      <p:cBhvr>
+                                        <p:cTn id="14" dur="1" fill="hold">
+                                          <p:stCondLst>
+                                            <p:cond delay="0"/>
+                                          </p:stCondLst>
+                                        </p:cTn>
+                                        <p:tgtEl>
+                                          <p:spTgt spid="3">
+                                            <p:txEl>
+                                              <p:pRg st="2" end="2"/>
+                                            </p:txEl>
+                                          </p:spTgt>
+                                        </p:tgtEl>
+                                        <p:attrNameLst>
+                                          <p:attrName>style.visibility</p:attrName>
+                                        </p:attrNameLst>
+                                      </p:cBhvr>
+                                      <p:to>
+                                        <p:strVal val="visible"/>
+                                      </p:to>
+                                    </p:set>
+                                    <p:animEffect transition="in" filter="fade">
+                                      <p:cBhvr>
+                                        <p:cTn id="15" dur="500"/>
+                                        <p:tgtEl>
+                                          <p:spTgt spid="3">
+                                            <p:txEl>
+                                              <p:pRg st="2" end="2"/>
+                                            </p:txEl>
+                                          </p:spTgt>
+                                        </p:tgtEl>
+                                      </p:cBhvr>
+                                    </p:animEffect>
+                                  </p:childTnLst>
+                                </p:cTn>
+                              </p:par>
+                            </p:childTnLst>
+                          </p:cTn>
+                        </p:par>
+                      </p:childTnLst>
+                    </p:cTn>
+                  </p:par>
+                  <p:par>
+                    <p:cTn id="16" fill="hold">
+                      <p:stCondLst>
+                        <p:cond delay="indefinite"/>
+                      </p:stCondLst>
+                      <p:childTnLst>
+                        <p:par>
+                          <p:cTn id="17" fill="hold">
+                            <p:stCondLst>
+                              <p:cond delay="0"/>
+                            </p:stCondLst>
+                            <p:childTnLst>
+                              <p:par>
+                                <p:cTn id="18" presetID="10" presetClass="entr" presetSubtype="0" fill="hold" grpId="0" nodeType="clickEffect">
+                                  <p:stCondLst>
+                                    <p:cond delay="0"/>
+                                  </p:stCondLst>
+                                  <p:childTnLst>
+                                    <p:set>
+                                      <p:cBhvr>
+                                        <p:cTn id="19" dur="1" fill="hold">
+                                          <p:stCondLst>
+                                            <p:cond delay="0"/>
+                                          </p:stCondLst>
+                                        </p:cTn>
+                                        <p:tgtEl>
+                                          <p:spTgt spid="3">
+                                            <p:txEl>
+                                              <p:pRg st="3" end="3"/>
+                                            </p:txEl>
+                                          </p:spTgt>
+                                        </p:tgtEl>
+                                        <p:attrNameLst>
+                                          <p:attrName>style.visibility</p:attrName>
+                                        </p:attrNameLst>
+                                      </p:cBhvr>
+                                      <p:to>
+                                        <p:strVal val="visible"/>
+                                      </p:to>
+                                    </p:set>
+                                    <p:animEffect transition="in" filter="fade">
+                                      <p:cBhvr>
+                                        <p:cTn id="20" dur="500"/>
+                                        <p:tgtEl>
+                                          <p:spTgt spid="3">
+                                            <p:txEl>
+                                              <p:pRg st="3" end="3"/>
+                                            </p:txEl>
+                                          </p:spTgt>
+                                        </p:tgtEl>
+                                      </p:cBhvr>
+                                    </p:animEffect>
+                                  </p:childTnLst>
+                                </p:cTn>
+                              </p:par>
+                              <p:par>
+                                <p:cTn id="21" presetID="10" presetClass="entr" presetSubtype="0" fill="hold" grpId="0" nodeType="withEffect">
+                                  <p:stCondLst>
+                                    <p:cond delay="0"/>
+                                  </p:stCondLst>
+                                  <p:childTnLst>
+                                    <p:set>
+                                      <p:cBhvr>
+                                        <p:cTn id="22" dur="1" fill="hold">
+                                          <p:stCondLst>
+                                            <p:cond delay="0"/>
+                                          </p:stCondLst>
+                                        </p:cTn>
+                                        <p:tgtEl>
+                                          <p:spTgt spid="3">
+                                            <p:txEl>
+                                              <p:pRg st="4" end="4"/>
+                                            </p:txEl>
+                                          </p:spTgt>
+                                        </p:tgtEl>
+                                        <p:attrNameLst>
+                                          <p:attrName>style.visibility</p:attrName>
+                                        </p:attrNameLst>
+                                      </p:cBhvr>
+                                      <p:to>
+                                        <p:strVal val="visible"/>
+                                      </p:to>
+                                    </p:set>
+                                    <p:animEffect transition="in" filter="fade">
+                                      <p:cBhvr>
+                                        <p:cTn id="23" dur="500"/>
+                                        <p:tgtEl>
+                                          <p:spTgt spid="3">
+                                            <p:txEl>
+                                              <p:pRg st="4" end="4"/>
+                                            </p:txEl>
+                                          </p:spTgt>
+                                        </p:tgtEl>
+                                      </p:cBhvr>
+                                    </p:animEffect>
+                                  </p:childTnLst>
+                                </p:cTn>
+                              </p:par>
+                            </p:childTnLst>
+                          </p:cTn>
+                        </p:par>
+                      </p:childTnLst>
+                    </p:cTn>
+                  </p:par>
+                </p:childTnLst>
+              </p:cTn>
+              <p:prevCondLst>
+                <p:cond evt="onPrev" delay="0">
+                  <p:tgtEl>
+                    <p:sldTgt/>
+                  </p:tgtEl>
+                </p:cond>
+              </p:prevCondLst>
+              <p:nextCondLst>
+                <p:cond evt="onNext" delay="0">
+                  <p:tgtEl>
+                    <p:sldTgt/>
+                  </p:tgtEl>
+                </p:cond>
+              </p:nextCondLst>
+            </p:seq>
+          </p:childTnLst>
+        </p:cTn>
+      </p:par>
+    </p:tnLst>
+    <p:bldLst>
+      <p:bldP spid="3" grpId="0" build="p"/>
+    </p:bldLst>
+  </p:timing>
+</p:sld>
+</file>
+
+<file path=ppt/slides/slide33.xml><?xml version="1.0" encoding="utf-8"?>
+<p:sld xmlns:a="http://schemas.openxmlformats.org/drawingml/2006/main" xmlns:r="http://schemas.openxmlformats.org/officeDocument/2006/relationships" xmlns:p="http://schemas.openxmlformats.org/presentationml/2006/main">
+  <p:cSld>
+    <p:spTree>
+      <p:nvGrpSpPr>
+        <p:cNvPr id="1" name=""/>
+        <p:cNvGrpSpPr/>
+        <p:nvPr/>
+      </p:nvGrpSpPr>
+      <p:grpSpPr>
+        <a:xfrm>
+          <a:off x="0" y="0"/>
+          <a:ext cx="0" cy="0"/>
+          <a:chOff x="0" y="0"/>
+          <a:chExt cx="0" cy="0"/>
+        </a:xfrm>
+      </p:grpSpPr>
+      <p:sp>
+        <p:nvSpPr>
+          <p:cNvPr id="2" name="Title 1"/>
+          <p:cNvSpPr>
+            <a:spLocks noGrp="1"/>
+          </p:cNvSpPr>
+          <p:nvPr>
+            <p:ph type="title"/>
+          </p:nvPr>
+        </p:nvSpPr>
+        <p:spPr/>
+        <p:txBody>
+          <a:bodyPr/>
+          <a:lstStyle/>
+          <a:p>
+            <a:r>
+              <a:rPr lang="en-US" dirty="0"/>
               <a:t>Push Model</a:t>
             </a:r>
             <a:endParaRPr lang="ru-RU" dirty="0"/>
@@ -12262,7 +12454,7 @@
 </p:sld>
 </file>
 
-<file path=ppt/slides/slide32.xml><?xml version="1.0" encoding="utf-8"?>
+<file path=ppt/slides/slide34.xml><?xml version="1.0" encoding="utf-8"?>
 <p:sld xmlns:a="http://schemas.openxmlformats.org/drawingml/2006/main" xmlns:r="http://schemas.openxmlformats.org/officeDocument/2006/relationships" xmlns:p="http://schemas.openxmlformats.org/presentationml/2006/main">
   <p:cSld>
     <p:spTree>
@@ -12554,7 +12746,7 @@
 </p:sld>
 </file>
 
-<file path=ppt/slides/slide33.xml><?xml version="1.0" encoding="utf-8"?>
+<file path=ppt/slides/slide35.xml><?xml version="1.0" encoding="utf-8"?>
 <p:sld xmlns:a="http://schemas.openxmlformats.org/drawingml/2006/main" xmlns:r="http://schemas.openxmlformats.org/officeDocument/2006/relationships" xmlns:p="http://schemas.openxmlformats.org/presentationml/2006/main">
   <p:cSld>
     <p:spTree>
@@ -12796,7 +12988,7 @@
 </p:sld>
 </file>
 
-<file path=ppt/slides/slide34.xml><?xml version="1.0" encoding="utf-8"?>
+<file path=ppt/slides/slide36.xml><?xml version="1.0" encoding="utf-8"?>
 <p:sld xmlns:a="http://schemas.openxmlformats.org/drawingml/2006/main" xmlns:r="http://schemas.openxmlformats.org/officeDocument/2006/relationships" xmlns:p="http://schemas.openxmlformats.org/presentationml/2006/main">
   <p:cSld>
     <p:spTree>
@@ -13251,7 +13443,7 @@
 </p:sld>
 </file>
 
-<file path=ppt/slides/slide35.xml><?xml version="1.0" encoding="utf-8"?>
+<file path=ppt/slides/slide37.xml><?xml version="1.0" encoding="utf-8"?>
 <p:sld xmlns:a="http://schemas.openxmlformats.org/drawingml/2006/main" xmlns:r="http://schemas.openxmlformats.org/officeDocument/2006/relationships" xmlns:p="http://schemas.openxmlformats.org/presentationml/2006/main">
   <p:cSld>
     <p:spTree>
@@ -13590,7 +13782,7 @@
 </p:sld>
 </file>
 
-<file path=ppt/slides/slide36.xml><?xml version="1.0" encoding="utf-8"?>
+<file path=ppt/slides/slide38.xml><?xml version="1.0" encoding="utf-8"?>
 <p:sld xmlns:a="http://schemas.openxmlformats.org/drawingml/2006/main" xmlns:r="http://schemas.openxmlformats.org/officeDocument/2006/relationships" xmlns:p="http://schemas.openxmlformats.org/presentationml/2006/main">
   <p:cSld>
     <p:spTree>
@@ -13991,7 +14183,7 @@
 </p:sld>
 </file>
 
-<file path=ppt/slides/slide37.xml><?xml version="1.0" encoding="utf-8"?>
+<file path=ppt/slides/slide39.xml><?xml version="1.0" encoding="utf-8"?>
 <p:sld xmlns:a="http://schemas.openxmlformats.org/drawingml/2006/main" xmlns:r="http://schemas.openxmlformats.org/officeDocument/2006/relationships" xmlns:p="http://schemas.openxmlformats.org/presentationml/2006/main">
   <p:cSld>
     <p:spTree>
@@ -14228,7 +14420,105 @@
 </p:sld>
 </file>
 
-<file path=ppt/slides/slide38.xml><?xml version="1.0" encoding="utf-8"?>
+<file path=ppt/slides/slide4.xml><?xml version="1.0" encoding="utf-8"?>
+<p:sld xmlns:a="http://schemas.openxmlformats.org/drawingml/2006/main" xmlns:r="http://schemas.openxmlformats.org/officeDocument/2006/relationships" xmlns:p="http://schemas.openxmlformats.org/presentationml/2006/main">
+  <p:cSld>
+    <p:spTree>
+      <p:nvGrpSpPr>
+        <p:cNvPr id="1" name=""/>
+        <p:cNvGrpSpPr/>
+        <p:nvPr/>
+      </p:nvGrpSpPr>
+      <p:grpSpPr>
+        <a:xfrm>
+          <a:off x="0" y="0"/>
+          <a:ext cx="0" cy="0"/>
+          <a:chOff x="0" y="0"/>
+          <a:chExt cx="0" cy="0"/>
+        </a:xfrm>
+      </p:grpSpPr>
+      <p:sp>
+        <p:nvSpPr>
+          <p:cNvPr id="2" name="Заголовок 1">
+            <a:extLst>
+              <a:ext uri="{FF2B5EF4-FFF2-40B4-BE49-F238E27FC236}">
+                <a16:creationId xmlns:a16="http://schemas.microsoft.com/office/drawing/2014/main" id="{D008A480-B2AC-1F39-293E-6242280DB134}"/>
+              </a:ext>
+            </a:extLst>
+          </p:cNvPr>
+          <p:cNvSpPr>
+            <a:spLocks noGrp="1"/>
+          </p:cNvSpPr>
+          <p:nvPr>
+            <p:ph type="title"/>
+          </p:nvPr>
+        </p:nvSpPr>
+        <p:spPr/>
+        <p:txBody>
+          <a:bodyPr/>
+          <a:lstStyle/>
+          <a:p>
+            <a:r>
+              <a:rPr lang="ru-RU" dirty="0"/>
+              <a:t>А как насчёт окон</a:t>
+            </a:r>
+            <a:r>
+              <a:rPr lang="en-US" dirty="0"/>
+              <a:t>?</a:t>
+            </a:r>
+            <a:endParaRPr lang="ru-RU" dirty="0"/>
+          </a:p>
+        </p:txBody>
+      </p:sp>
+      <p:pic>
+        <p:nvPicPr>
+          <p:cNvPr id="5" name="Объект 4">
+            <a:extLst>
+              <a:ext uri="{FF2B5EF4-FFF2-40B4-BE49-F238E27FC236}">
+                <a16:creationId xmlns:a16="http://schemas.microsoft.com/office/drawing/2014/main" id="{96A5AA5C-14CC-7677-F546-E41121A0605A}"/>
+              </a:ext>
+            </a:extLst>
+          </p:cNvPr>
+          <p:cNvPicPr>
+            <a:picLocks noGrp="1" noChangeAspect="1"/>
+          </p:cNvPicPr>
+          <p:nvPr>
+            <p:ph idx="1"/>
+          </p:nvPr>
+        </p:nvPicPr>
+        <p:blipFill>
+          <a:blip r:embed="rId2">
+            <a:extLst>
+              <a:ext uri="{28A0092B-C50C-407E-A947-70E740481C1C}">
+                <a14:useLocalDpi xmlns:a14="http://schemas.microsoft.com/office/drawing/2010/main" val="0"/>
+              </a:ext>
+            </a:extLst>
+          </a:blip>
+          <a:stretch>
+            <a:fillRect/>
+          </a:stretch>
+        </p:blipFill>
+        <p:spPr>
+          <a:xfrm>
+            <a:off x="457200" y="2084977"/>
+            <a:ext cx="8229600" cy="4005671"/>
+          </a:xfrm>
+        </p:spPr>
+      </p:pic>
+    </p:spTree>
+    <p:extLst>
+      <p:ext uri="{BB962C8B-B14F-4D97-AF65-F5344CB8AC3E}">
+        <p14:creationId xmlns:p14="http://schemas.microsoft.com/office/powerpoint/2010/main" val="1732430678"/>
+      </p:ext>
+    </p:extLst>
+  </p:cSld>
+  <p:clrMapOvr>
+    <a:masterClrMapping/>
+  </p:clrMapOvr>
+</p:sld>
+</file>
+
+<file path=ppt/slides/slide40.xml><?xml version="1.0" encoding="utf-8"?>
 <p:sld xmlns:a="http://schemas.openxmlformats.org/drawingml/2006/main" xmlns:r="http://schemas.openxmlformats.org/officeDocument/2006/relationships" xmlns:p="http://schemas.openxmlformats.org/presentationml/2006/main">
   <p:cSld>
     <p:spTree>
@@ -15270,7 +15560,7 @@
 </p:sld>
 </file>
 
-<file path=ppt/slides/slide39.xml><?xml version="1.0" encoding="utf-8"?>
+<file path=ppt/slides/slide41.xml><?xml version="1.0" encoding="utf-8"?>
 <p:sld xmlns:a="http://schemas.openxmlformats.org/drawingml/2006/main" xmlns:r="http://schemas.openxmlformats.org/officeDocument/2006/relationships" xmlns:p="http://schemas.openxmlformats.org/presentationml/2006/main">
   <p:cSld>
     <p:spTree>
@@ -17782,225 +18072,7 @@
 </p:sld>
 </file>
 
-<file path=ppt/slides/slide4.xml><?xml version="1.0" encoding="utf-8"?>
-<p:sld xmlns:a="http://schemas.openxmlformats.org/drawingml/2006/main" xmlns:r="http://schemas.openxmlformats.org/officeDocument/2006/relationships" xmlns:p="http://schemas.openxmlformats.org/presentationml/2006/main">
-  <p:cSld>
-    <p:spTree>
-      <p:nvGrpSpPr>
-        <p:cNvPr id="1" name=""/>
-        <p:cNvGrpSpPr/>
-        <p:nvPr/>
-      </p:nvGrpSpPr>
-      <p:grpSpPr>
-        <a:xfrm>
-          <a:off x="0" y="0"/>
-          <a:ext cx="0" cy="0"/>
-          <a:chOff x="0" y="0"/>
-          <a:chExt cx="0" cy="0"/>
-        </a:xfrm>
-      </p:grpSpPr>
-      <p:sp>
-        <p:nvSpPr>
-          <p:cNvPr id="2" name="Заголовок 1">
-            <a:extLst>
-              <a:ext uri="{FF2B5EF4-FFF2-40B4-BE49-F238E27FC236}">
-                <a16:creationId xmlns:a16="http://schemas.microsoft.com/office/drawing/2014/main" id="{3031DCBF-2A6B-0FCD-BAFC-946192F98DA0}"/>
-              </a:ext>
-            </a:extLst>
-          </p:cNvPr>
-          <p:cNvSpPr>
-            <a:spLocks noGrp="1"/>
-          </p:cNvSpPr>
-          <p:nvPr>
-            <p:ph type="title"/>
-          </p:nvPr>
-        </p:nvSpPr>
-        <p:spPr/>
-        <p:txBody>
-          <a:bodyPr/>
-          <a:lstStyle/>
-          <a:p>
-            <a:r>
-              <a:rPr lang="ru-RU" dirty="0"/>
-              <a:t>Умный дом</a:t>
-            </a:r>
-          </a:p>
-        </p:txBody>
-      </p:sp>
-      <p:pic>
-        <p:nvPicPr>
-          <p:cNvPr id="5" name="Объект 4">
-            <a:extLst>
-              <a:ext uri="{FF2B5EF4-FFF2-40B4-BE49-F238E27FC236}">
-                <a16:creationId xmlns:a16="http://schemas.microsoft.com/office/drawing/2014/main" id="{F591236F-FA54-27EE-76BC-92A13064E087}"/>
-              </a:ext>
-            </a:extLst>
-          </p:cNvPr>
-          <p:cNvPicPr>
-            <a:picLocks noGrp="1" noChangeAspect="1"/>
-          </p:cNvPicPr>
-          <p:nvPr>
-            <p:ph idx="1"/>
-          </p:nvPr>
-        </p:nvPicPr>
-        <p:blipFill>
-          <a:blip r:embed="rId3">
-            <a:extLst>
-              <a:ext uri="{28A0092B-C50C-407E-A947-70E740481C1C}">
-                <a14:useLocalDpi xmlns:a14="http://schemas.microsoft.com/office/drawing/2010/main" val="0"/>
-              </a:ext>
-            </a:extLst>
-          </a:blip>
-          <a:srcRect/>
-          <a:stretch/>
-        </p:blipFill>
-        <p:spPr>
-          <a:xfrm>
-            <a:off x="457200" y="2759881"/>
-            <a:ext cx="8229600" cy="2655862"/>
-          </a:xfrm>
-        </p:spPr>
-      </p:pic>
-      <p:sp>
-        <p:nvSpPr>
-          <p:cNvPr id="6" name="TextBox 5">
-            <a:extLst>
-              <a:ext uri="{FF2B5EF4-FFF2-40B4-BE49-F238E27FC236}">
-                <a16:creationId xmlns:a16="http://schemas.microsoft.com/office/drawing/2014/main" id="{E71F64BE-41CB-F6C3-27CA-8A57A6554AB5}"/>
-              </a:ext>
-            </a:extLst>
-          </p:cNvPr>
-          <p:cNvSpPr txBox="1"/>
-          <p:nvPr/>
-        </p:nvSpPr>
-        <p:spPr>
-          <a:xfrm>
-            <a:off x="1907704" y="5949280"/>
-            <a:ext cx="5328592" cy="646331"/>
-          </a:xfrm>
-          <a:prstGeom prst="rect">
-            <a:avLst/>
-          </a:prstGeom>
-          <a:noFill/>
-        </p:spPr>
-        <p:txBody>
-          <a:bodyPr wrap="square" rtlCol="0">
-            <a:spAutoFit/>
-          </a:bodyPr>
-          <a:lstStyle/>
-          <a:p>
-            <a:r>
-              <a:rPr lang="ru-RU" dirty="0"/>
-              <a:t>Как умный дом узнает, в какой момент включить или выключить свет и музыку</a:t>
-            </a:r>
-            <a:r>
-              <a:rPr lang="en-US" dirty="0"/>
-              <a:t>?</a:t>
-            </a:r>
-            <a:endParaRPr lang="ru-RU" dirty="0"/>
-          </a:p>
-        </p:txBody>
-      </p:sp>
-    </p:spTree>
-    <p:extLst>
-      <p:ext uri="{BB962C8B-B14F-4D97-AF65-F5344CB8AC3E}">
-        <p14:creationId xmlns:p14="http://schemas.microsoft.com/office/powerpoint/2010/main" val="2752657398"/>
-      </p:ext>
-    </p:extLst>
-  </p:cSld>
-  <p:clrMapOvr>
-    <a:masterClrMapping/>
-  </p:clrMapOvr>
-  <p:timing>
-    <p:tnLst>
-      <p:par>
-        <p:cTn id="1" dur="indefinite" restart="never" nodeType="tmRoot">
-          <p:childTnLst>
-            <p:seq concurrent="1" nextAc="seek">
-              <p:cTn id="2" dur="indefinite" nodeType="mainSeq">
-                <p:childTnLst>
-                  <p:par>
-                    <p:cTn id="3" fill="hold">
-                      <p:stCondLst>
-                        <p:cond delay="indefinite"/>
-                      </p:stCondLst>
-                      <p:childTnLst>
-                        <p:par>
-                          <p:cTn id="4" fill="hold">
-                            <p:stCondLst>
-                              <p:cond delay="0"/>
-                            </p:stCondLst>
-                            <p:childTnLst>
-                              <p:par>
-                                <p:cTn id="5" presetID="10" presetClass="entr" presetSubtype="0" fill="hold" grpId="0" nodeType="clickEffect">
-                                  <p:stCondLst>
-                                    <p:cond delay="0"/>
-                                  </p:stCondLst>
-                                  <p:childTnLst>
-                                    <p:set>
-                                      <p:cBhvr>
-                                        <p:cTn id="6" dur="1" fill="hold">
-                                          <p:stCondLst>
-                                            <p:cond delay="0"/>
-                                          </p:stCondLst>
-                                        </p:cTn>
-                                        <p:tgtEl>
-                                          <p:spTgt spid="6"/>
-                                        </p:tgtEl>
-                                        <p:attrNameLst>
-                                          <p:attrName>style.visibility</p:attrName>
-                                        </p:attrNameLst>
-                                      </p:cBhvr>
-                                      <p:to>
-                                        <p:strVal val="visible"/>
-                                      </p:to>
-                                    </p:set>
-                                    <p:animEffect transition="in" filter="fade">
-                                      <p:cBhvr>
-                                        <p:cTn id="7" dur="500"/>
-                                        <p:tgtEl>
-                                          <p:spTgt spid="6"/>
-                                        </p:tgtEl>
-                                      </p:cBhvr>
-                                    </p:animEffect>
-                                  </p:childTnLst>
-                                </p:cTn>
-                              </p:par>
-                            </p:childTnLst>
-                          </p:cTn>
-                        </p:par>
-                      </p:childTnLst>
-                    </p:cTn>
-                  </p:par>
-                </p:childTnLst>
-              </p:cTn>
-              <p:prevCondLst>
-                <p:cond evt="onPrev" delay="0">
-                  <p:tgtEl>
-                    <p:sldTgt/>
-                  </p:tgtEl>
-                </p:cond>
-              </p:prevCondLst>
-              <p:nextCondLst>
-                <p:cond evt="onNext" delay="0">
-                  <p:tgtEl>
-                    <p:sldTgt/>
-                  </p:tgtEl>
-                </p:cond>
-              </p:nextCondLst>
-            </p:seq>
-          </p:childTnLst>
-        </p:cTn>
-      </p:par>
-    </p:tnLst>
-    <p:bldLst>
-      <p:bldP spid="6" grpId="0"/>
-    </p:bldLst>
-  </p:timing>
-</p:sld>
-</file>
-
-<file path=ppt/slides/slide40.xml><?xml version="1.0" encoding="utf-8"?>
+<file path=ppt/slides/slide42.xml><?xml version="1.0" encoding="utf-8"?>
 <p:sld xmlns:a="http://schemas.openxmlformats.org/drawingml/2006/main" xmlns:r="http://schemas.openxmlformats.org/officeDocument/2006/relationships" xmlns:p="http://schemas.openxmlformats.org/presentationml/2006/main">
   <p:cSld>
     <p:spTree>
@@ -20650,7 +20722,7 @@
 </p:sld>
 </file>
 
-<file path=ppt/slides/slide41.xml><?xml version="1.0" encoding="utf-8"?>
+<file path=ppt/slides/slide43.xml><?xml version="1.0" encoding="utf-8"?>
 <p:sld xmlns:a="http://schemas.openxmlformats.org/drawingml/2006/main" xmlns:r="http://schemas.openxmlformats.org/officeDocument/2006/relationships" xmlns:p="http://schemas.openxmlformats.org/presentationml/2006/main">
   <p:cSld>
     <p:spTree>
@@ -23970,6 +24042,224 @@
       </p:grpSpPr>
       <p:sp>
         <p:nvSpPr>
+          <p:cNvPr id="2" name="Заголовок 1">
+            <a:extLst>
+              <a:ext uri="{FF2B5EF4-FFF2-40B4-BE49-F238E27FC236}">
+                <a16:creationId xmlns:a16="http://schemas.microsoft.com/office/drawing/2014/main" id="{3031DCBF-2A6B-0FCD-BAFC-946192F98DA0}"/>
+              </a:ext>
+            </a:extLst>
+          </p:cNvPr>
+          <p:cNvSpPr>
+            <a:spLocks noGrp="1"/>
+          </p:cNvSpPr>
+          <p:nvPr>
+            <p:ph type="title"/>
+          </p:nvPr>
+        </p:nvSpPr>
+        <p:spPr/>
+        <p:txBody>
+          <a:bodyPr/>
+          <a:lstStyle/>
+          <a:p>
+            <a:r>
+              <a:rPr lang="ru-RU" dirty="0"/>
+              <a:t>Умный дом</a:t>
+            </a:r>
+          </a:p>
+        </p:txBody>
+      </p:sp>
+      <p:pic>
+        <p:nvPicPr>
+          <p:cNvPr id="5" name="Объект 4">
+            <a:extLst>
+              <a:ext uri="{FF2B5EF4-FFF2-40B4-BE49-F238E27FC236}">
+                <a16:creationId xmlns:a16="http://schemas.microsoft.com/office/drawing/2014/main" id="{F591236F-FA54-27EE-76BC-92A13064E087}"/>
+              </a:ext>
+            </a:extLst>
+          </p:cNvPr>
+          <p:cNvPicPr>
+            <a:picLocks noGrp="1" noChangeAspect="1"/>
+          </p:cNvPicPr>
+          <p:nvPr>
+            <p:ph idx="1"/>
+          </p:nvPr>
+        </p:nvPicPr>
+        <p:blipFill>
+          <a:blip r:embed="rId3">
+            <a:extLst>
+              <a:ext uri="{28A0092B-C50C-407E-A947-70E740481C1C}">
+                <a14:useLocalDpi xmlns:a14="http://schemas.microsoft.com/office/drawing/2010/main" val="0"/>
+              </a:ext>
+            </a:extLst>
+          </a:blip>
+          <a:srcRect/>
+          <a:stretch/>
+        </p:blipFill>
+        <p:spPr>
+          <a:xfrm>
+            <a:off x="827584" y="2126194"/>
+            <a:ext cx="8122368" cy="4255133"/>
+          </a:xfrm>
+        </p:spPr>
+      </p:pic>
+      <p:sp>
+        <p:nvSpPr>
+          <p:cNvPr id="6" name="TextBox 5">
+            <a:extLst>
+              <a:ext uri="{FF2B5EF4-FFF2-40B4-BE49-F238E27FC236}">
+                <a16:creationId xmlns:a16="http://schemas.microsoft.com/office/drawing/2014/main" id="{E71F64BE-41CB-F6C3-27CA-8A57A6554AB5}"/>
+              </a:ext>
+            </a:extLst>
+          </p:cNvPr>
+          <p:cNvSpPr txBox="1"/>
+          <p:nvPr/>
+        </p:nvSpPr>
+        <p:spPr>
+          <a:xfrm>
+            <a:off x="683568" y="5725436"/>
+            <a:ext cx="5328592" cy="646331"/>
+          </a:xfrm>
+          <a:prstGeom prst="rect">
+            <a:avLst/>
+          </a:prstGeom>
+          <a:noFill/>
+        </p:spPr>
+        <p:txBody>
+          <a:bodyPr wrap="square" rtlCol="0">
+            <a:spAutoFit/>
+          </a:bodyPr>
+          <a:lstStyle/>
+          <a:p>
+            <a:r>
+              <a:rPr lang="ru-RU" dirty="0"/>
+              <a:t>Как умный дом узнает, в какой момент включить или выключить свет и музыку</a:t>
+            </a:r>
+            <a:r>
+              <a:rPr lang="en-US" dirty="0"/>
+              <a:t>?</a:t>
+            </a:r>
+            <a:endParaRPr lang="ru-RU" dirty="0"/>
+          </a:p>
+        </p:txBody>
+      </p:sp>
+    </p:spTree>
+    <p:extLst>
+      <p:ext uri="{BB962C8B-B14F-4D97-AF65-F5344CB8AC3E}">
+        <p14:creationId xmlns:p14="http://schemas.microsoft.com/office/powerpoint/2010/main" val="2752657398"/>
+      </p:ext>
+    </p:extLst>
+  </p:cSld>
+  <p:clrMapOvr>
+    <a:masterClrMapping/>
+  </p:clrMapOvr>
+  <p:timing>
+    <p:tnLst>
+      <p:par>
+        <p:cTn id="1" dur="indefinite" restart="never" nodeType="tmRoot">
+          <p:childTnLst>
+            <p:seq concurrent="1" nextAc="seek">
+              <p:cTn id="2" dur="indefinite" nodeType="mainSeq">
+                <p:childTnLst>
+                  <p:par>
+                    <p:cTn id="3" fill="hold">
+                      <p:stCondLst>
+                        <p:cond delay="indefinite"/>
+                      </p:stCondLst>
+                      <p:childTnLst>
+                        <p:par>
+                          <p:cTn id="4" fill="hold">
+                            <p:stCondLst>
+                              <p:cond delay="0"/>
+                            </p:stCondLst>
+                            <p:childTnLst>
+                              <p:par>
+                                <p:cTn id="5" presetID="10" presetClass="entr" presetSubtype="0" fill="hold" grpId="0" nodeType="clickEffect">
+                                  <p:stCondLst>
+                                    <p:cond delay="0"/>
+                                  </p:stCondLst>
+                                  <p:childTnLst>
+                                    <p:set>
+                                      <p:cBhvr>
+                                        <p:cTn id="6" dur="1" fill="hold">
+                                          <p:stCondLst>
+                                            <p:cond delay="0"/>
+                                          </p:stCondLst>
+                                        </p:cTn>
+                                        <p:tgtEl>
+                                          <p:spTgt spid="6"/>
+                                        </p:tgtEl>
+                                        <p:attrNameLst>
+                                          <p:attrName>style.visibility</p:attrName>
+                                        </p:attrNameLst>
+                                      </p:cBhvr>
+                                      <p:to>
+                                        <p:strVal val="visible"/>
+                                      </p:to>
+                                    </p:set>
+                                    <p:animEffect transition="in" filter="fade">
+                                      <p:cBhvr>
+                                        <p:cTn id="7" dur="500"/>
+                                        <p:tgtEl>
+                                          <p:spTgt spid="6"/>
+                                        </p:tgtEl>
+                                      </p:cBhvr>
+                                    </p:animEffect>
+                                  </p:childTnLst>
+                                </p:cTn>
+                              </p:par>
+                            </p:childTnLst>
+                          </p:cTn>
+                        </p:par>
+                      </p:childTnLst>
+                    </p:cTn>
+                  </p:par>
+                </p:childTnLst>
+              </p:cTn>
+              <p:prevCondLst>
+                <p:cond evt="onPrev" delay="0">
+                  <p:tgtEl>
+                    <p:sldTgt/>
+                  </p:tgtEl>
+                </p:cond>
+              </p:prevCondLst>
+              <p:nextCondLst>
+                <p:cond evt="onNext" delay="0">
+                  <p:tgtEl>
+                    <p:sldTgt/>
+                  </p:tgtEl>
+                </p:cond>
+              </p:nextCondLst>
+            </p:seq>
+          </p:childTnLst>
+        </p:cTn>
+      </p:par>
+    </p:tnLst>
+    <p:bldLst>
+      <p:bldP spid="6" grpId="0"/>
+    </p:bldLst>
+  </p:timing>
+</p:sld>
+</file>
+
+<file path=ppt/slides/slide6.xml><?xml version="1.0" encoding="utf-8"?>
+<p:sld xmlns:a="http://schemas.openxmlformats.org/drawingml/2006/main" xmlns:r="http://schemas.openxmlformats.org/officeDocument/2006/relationships" xmlns:p="http://schemas.openxmlformats.org/presentationml/2006/main">
+  <p:cSld>
+    <p:spTree>
+      <p:nvGrpSpPr>
+        <p:cNvPr id="1" name=""/>
+        <p:cNvGrpSpPr/>
+        <p:nvPr/>
+      </p:nvGrpSpPr>
+      <p:grpSpPr>
+        <a:xfrm>
+          <a:off x="0" y="0"/>
+          <a:ext cx="0" cy="0"/>
+          <a:chOff x="0" y="0"/>
+          <a:chExt cx="0" cy="0"/>
+        </a:xfrm>
+      </p:grpSpPr>
+      <p:sp>
+        <p:nvSpPr>
           <p:cNvPr id="4" name="Заголовок 3"/>
           <p:cNvSpPr>
             <a:spLocks noGrp="1"/>
@@ -24123,7 +24413,7 @@
 </p:sld>
 </file>
 
-<file path=ppt/slides/slide6.xml><?xml version="1.0" encoding="utf-8"?>
+<file path=ppt/slides/slide7.xml><?xml version="1.0" encoding="utf-8"?>
 <p:sld xmlns:a="http://schemas.openxmlformats.org/drawingml/2006/main" xmlns:r="http://schemas.openxmlformats.org/officeDocument/2006/relationships" xmlns:p="http://schemas.openxmlformats.org/presentationml/2006/main">
   <p:cSld>
     <p:spTree>
@@ -24263,7 +24553,7 @@
 </p:sld>
 </file>
 
-<file path=ppt/slides/slide7.xml><?xml version="1.0" encoding="utf-8"?>
+<file path=ppt/slides/slide8.xml><?xml version="1.0" encoding="utf-8"?>
 <p:sld xmlns:a="http://schemas.openxmlformats.org/drawingml/2006/main" xmlns:r="http://schemas.openxmlformats.org/officeDocument/2006/relationships" xmlns:p="http://schemas.openxmlformats.org/presentationml/2006/main">
   <p:cSld>
     <p:spTree>
@@ -25340,7 +25630,7 @@
 </p:sld>
 </file>
 
-<file path=ppt/slides/slide8.xml><?xml version="1.0" encoding="utf-8"?>
+<file path=ppt/slides/slide9.xml><?xml version="1.0" encoding="utf-8"?>
 <p:sld xmlns:a="http://schemas.openxmlformats.org/drawingml/2006/main" xmlns:r="http://schemas.openxmlformats.org/officeDocument/2006/relationships" xmlns:p="http://schemas.openxmlformats.org/presentationml/2006/main">
   <p:cSld>
     <p:spTree>
@@ -25720,94 +26010,6 @@
       <p:bldP spid="3" grpId="0" build="p"/>
     </p:bldLst>
   </p:timing>
-</p:sld>
-</file>
-
-<file path=ppt/slides/slide9.xml><?xml version="1.0" encoding="utf-8"?>
-<p:sld xmlns:a="http://schemas.openxmlformats.org/drawingml/2006/main" xmlns:r="http://schemas.openxmlformats.org/officeDocument/2006/relationships" xmlns:p="http://schemas.openxmlformats.org/presentationml/2006/main">
-  <p:cSld>
-    <p:spTree>
-      <p:nvGrpSpPr>
-        <p:cNvPr id="1" name=""/>
-        <p:cNvGrpSpPr/>
-        <p:nvPr/>
-      </p:nvGrpSpPr>
-      <p:grpSpPr>
-        <a:xfrm>
-          <a:off x="0" y="0"/>
-          <a:ext cx="0" cy="0"/>
-          <a:chOff x="0" y="0"/>
-          <a:chExt cx="0" cy="0"/>
-        </a:xfrm>
-      </p:grpSpPr>
-      <p:sp>
-        <p:nvSpPr>
-          <p:cNvPr id="2" name="Заголовок 1"/>
-          <p:cNvSpPr>
-            <a:spLocks noGrp="1"/>
-          </p:cNvSpPr>
-          <p:nvPr>
-            <p:ph type="title"/>
-          </p:nvPr>
-        </p:nvSpPr>
-        <p:spPr/>
-        <p:txBody>
-          <a:bodyPr/>
-          <a:lstStyle/>
-          <a:p>
-            <a:r>
-              <a:rPr lang="ru-RU" dirty="0"/>
-              <a:t>Требования к приложению</a:t>
-            </a:r>
-          </a:p>
-        </p:txBody>
-      </p:sp>
-      <p:sp>
-        <p:nvSpPr>
-          <p:cNvPr id="3" name="Объект 2"/>
-          <p:cNvSpPr>
-            <a:spLocks noGrp="1"/>
-          </p:cNvSpPr>
-          <p:nvPr>
-            <p:ph idx="1"/>
-          </p:nvPr>
-        </p:nvSpPr>
-        <p:spPr/>
-        <p:txBody>
-          <a:bodyPr/>
-          <a:lstStyle/>
-          <a:p>
-            <a:r>
-              <a:rPr lang="ru-RU" dirty="0"/>
-              <a:t>Расширяемость</a:t>
-            </a:r>
-          </a:p>
-          <a:p>
-            <a:pPr lvl="1"/>
-            <a:r>
-              <a:rPr lang="ru-RU" dirty="0"/>
-              <a:t>Возможность реализации дополнительных экранов вывода</a:t>
-            </a:r>
-          </a:p>
-          <a:p>
-            <a:pPr lvl="1"/>
-            <a:r>
-              <a:rPr lang="ru-RU" dirty="0"/>
-              <a:t>Возможность динамического добавления и удаления экранов</a:t>
-            </a:r>
-          </a:p>
-        </p:txBody>
-      </p:sp>
-    </p:spTree>
-    <p:extLst>
-      <p:ext uri="{BB962C8B-B14F-4D97-AF65-F5344CB8AC3E}">
-        <p14:creationId xmlns:p14="http://schemas.microsoft.com/office/powerpoint/2010/main" val="1428663581"/>
-      </p:ext>
-    </p:extLst>
-  </p:cSld>
-  <p:clrMapOvr>
-    <a:masterClrMapping/>
-  </p:clrMapOvr>
 </p:sld>
 </file>
 

</xml_diff>